<commit_message>
Add some information about the Navajo code talkers
</commit_message>
<xml_diff>
--- a/FinalPP.pptx
+++ b/FinalPP.pptx
@@ -1443,7 +1443,7 @@
           <a:p>
             <a:fld id="{50A1B9BC-7BE7-4893-90FD-CC95830FD8F2}" type="datetimeFigureOut">
               <a:rPr lang="en-US" smtClean="0"/>
-              <a:t>3/2/2021</a:t>
+              <a:t>3/2/21</a:t>
             </a:fld>
             <a:endParaRPr lang="en-US" dirty="0"/>
           </a:p>
@@ -3823,7 +3823,7 @@
             <a:fld id="{1D364696-E1F3-49EF-AEC8-730A16D9A23F}" type="datetimeFigureOut">
               <a:rPr lang="en-US" altLang="en-US" smtClean="0"/>
               <a:pPr/>
-              <a:t>3/2/2021</a:t>
+              <a:t>3/2/21</a:t>
             </a:fld>
             <a:endParaRPr lang="en-US" altLang="en-US" dirty="0"/>
           </a:p>
@@ -6848,7 +6848,7 @@
         <p:spPr/>
         <p:txBody>
           <a:bodyPr vert="horz" lIns="91440" tIns="45720" rIns="91440" bIns="45720" rtlCol="0" anchor="t">
-            <a:normAutofit/>
+            <a:normAutofit lnSpcReduction="10000"/>
           </a:bodyPr>
           <a:lstStyle/>
           <a:p>
@@ -6886,6 +6886,23 @@
               <a:buChar char="•"/>
             </a:pPr>
             <a:r>
+              <a:rPr lang="en-US" sz="1800" b="0" dirty="0"/>
+              <a:t>Navajo played a big part in World War II. As code talkers and hold events in Window Rock, AZ to honor the Code talkers </a:t>
+            </a:r>
+            <a:endParaRPr lang="en-US" sz="1800" b="0" dirty="0">
+              <a:solidFill>
+                <a:schemeClr val="accent6">
+                  <a:lumMod val="50000"/>
+                </a:schemeClr>
+              </a:solidFill>
+            </a:endParaRPr>
+          </a:p>
+          <a:p>
+            <a:pPr marL="342900" indent="-342900">
+              <a:buFont typeface="Arial" panose="020B0604020202020204" pitchFamily="34" charset="0"/>
+              <a:buChar char="•"/>
+            </a:pPr>
+            <a:r>
               <a:rPr lang="en-US" sz="1800" b="0" dirty="0">
                 <a:solidFill>
                   <a:schemeClr val="accent6">
@@ -6909,8 +6926,38 @@
                   </a:schemeClr>
                 </a:solidFill>
               </a:rPr>
-              <a:t>In 1990, President George H.W. Bush designated November as National American Indian Heritage Month.</a:t>
-            </a:r>
+              <a:t>In 1990, President George H.W. Bush designated November as National American Indian Heritage </a:t>
+            </a:r>
+            <a:r>
+              <a:rPr lang="en-US" sz="1800" b="0" dirty="0" err="1">
+                <a:solidFill>
+                  <a:schemeClr val="accent6">
+                    <a:lumMod val="50000"/>
+                  </a:schemeClr>
+                </a:solidFill>
+              </a:rPr>
+              <a:t>Month.nNav</a:t>
+            </a:r>
+            <a:endParaRPr lang="en-US" sz="1800" b="0" dirty="0">
+              <a:solidFill>
+                <a:schemeClr val="accent6">
+                  <a:lumMod val="50000"/>
+                </a:schemeClr>
+              </a:solidFill>
+            </a:endParaRPr>
+          </a:p>
+          <a:p>
+            <a:pPr marL="342900" indent="-342900">
+              <a:buFont typeface="Arial" panose="020B0604020202020204" pitchFamily="34" charset="0"/>
+              <a:buChar char="•"/>
+            </a:pPr>
+            <a:endParaRPr lang="en-US" sz="1800" b="0" dirty="0">
+              <a:solidFill>
+                <a:schemeClr val="accent6">
+                  <a:lumMod val="50000"/>
+                </a:schemeClr>
+              </a:solidFill>
+            </a:endParaRPr>
           </a:p>
           <a:p>
             <a:endParaRPr lang="en-US" sz="1800" dirty="0"/>
@@ -8740,21 +8787,21 @@
 </file>
 
 <file path=customXml/item1.xml><?xml version="1.0" encoding="utf-8"?>
+<?mso-contentType ?>
+<FormTemplates xmlns="http://schemas.microsoft.com/sharepoint/v3/contenttype/forms">
+  <Display>DocumentLibraryForm</Display>
+  <Edit>DocumentLibraryForm</Edit>
+  <New>DocumentLibraryForm</New>
+</FormTemplates>
+</file>
+
+<file path=customXml/item2.xml><?xml version="1.0" encoding="utf-8"?>
 <p:properties xmlns:p="http://schemas.microsoft.com/office/2006/metadata/properties" xmlns:xsi="http://www.w3.org/2001/XMLSchema-instance" xmlns:pc="http://schemas.microsoft.com/office/infopath/2007/PartnerControls">
   <documentManagement>
     <Status xmlns="71af3243-3dd4-4a8d-8c0d-dd76da1f02a5">Not started</Status>
     <MediaServiceKeyPoints xmlns="71af3243-3dd4-4a8d-8c0d-dd76da1f02a5" xsi:nil="true"/>
   </documentManagement>
 </p:properties>
-</file>
-
-<file path=customXml/item2.xml><?xml version="1.0" encoding="utf-8"?>
-<?mso-contentType ?>
-<FormTemplates xmlns="http://schemas.microsoft.com/sharepoint/v3/contenttype/forms">
-  <Display>DocumentLibraryForm</Display>
-  <Edit>DocumentLibraryForm</Edit>
-  <New>DocumentLibraryForm</New>
-</FormTemplates>
 </file>
 
 <file path=customXml/item3.xml><?xml version="1.0" encoding="utf-8"?>
@@ -8979,19 +9026,19 @@
 </file>
 
 <file path=customXml/itemProps1.xml><?xml version="1.0" encoding="utf-8"?>
+<ds:datastoreItem xmlns:ds="http://schemas.openxmlformats.org/officeDocument/2006/customXml" ds:itemID="{FF48AAC1-C4CE-4FF3-AA8D-E74D22748061}">
+  <ds:schemaRefs>
+    <ds:schemaRef ds:uri="http://schemas.microsoft.com/sharepoint/v3/contenttype/forms"/>
+  </ds:schemaRefs>
+</ds:datastoreItem>
+</file>
+
+<file path=customXml/itemProps2.xml><?xml version="1.0" encoding="utf-8"?>
 <ds:datastoreItem xmlns:ds="http://schemas.openxmlformats.org/officeDocument/2006/customXml" ds:itemID="{F87694BC-F79F-405B-BC53-DDA5DE16E747}">
   <ds:schemaRefs>
     <ds:schemaRef ds:uri="http://schemas.microsoft.com/office/2006/metadata/properties"/>
     <ds:schemaRef ds:uri="http://schemas.microsoft.com/office/infopath/2007/PartnerControls"/>
     <ds:schemaRef ds:uri="71af3243-3dd4-4a8d-8c0d-dd76da1f02a5"/>
-  </ds:schemaRefs>
-</ds:datastoreItem>
-</file>
-
-<file path=customXml/itemProps2.xml><?xml version="1.0" encoding="utf-8"?>
-<ds:datastoreItem xmlns:ds="http://schemas.openxmlformats.org/officeDocument/2006/customXml" ds:itemID="{FF48AAC1-C4CE-4FF3-AA8D-E74D22748061}">
-  <ds:schemaRefs>
-    <ds:schemaRef ds:uri="http://schemas.microsoft.com/sharepoint/v3/contenttype/forms"/>
   </ds:schemaRefs>
 </ds:datastoreItem>
 </file>

</xml_diff>

<commit_message>
Add Richard Bio information on the Navajo and the impact of COVID
</commit_message>
<xml_diff>
--- a/FinalPP.pptx
+++ b/FinalPP.pptx
@@ -160,7 +160,7 @@
   </p:defaultTextStyle>
   <p:extLst>
     <p:ext uri="{EFAFB233-063F-42B5-8137-9DF3F51BA10A}">
-      <p15:sldGuideLst xmlns="" xmlns:p15="http://schemas.microsoft.com/office/powerpoint/2012/main">
+      <p15:sldGuideLst xmlns:p15="http://schemas.microsoft.com/office/powerpoint/2012/main">
         <p15:guide id="1" orient="horz" pos="2160" userDrawn="1">
           <p15:clr>
             <a:srgbClr val="A4A3A4"/>
@@ -217,7 +217,7 @@
           <p:cNvPr id="30722" name="Rectangle 2">
             <a:extLst>
               <a:ext uri="{FF2B5EF4-FFF2-40B4-BE49-F238E27FC236}">
-                <a16:creationId xmlns="" xmlns:a16="http://schemas.microsoft.com/office/drawing/2014/main" id="{D9F622F8-1824-4338-8C3C-5529D3BDEF4A}"/>
+                <a16:creationId xmlns:a16="http://schemas.microsoft.com/office/drawing/2014/main" id="{D9F622F8-1824-4338-8C3C-5529D3BDEF4A}"/>
               </a:ext>
             </a:extLst>
           </p:cNvPr>
@@ -271,7 +271,7 @@
           <p:cNvPr id="30723" name="Rectangle 3">
             <a:extLst>
               <a:ext uri="{FF2B5EF4-FFF2-40B4-BE49-F238E27FC236}">
-                <a16:creationId xmlns="" xmlns:a16="http://schemas.microsoft.com/office/drawing/2014/main" id="{618DDD53-BB38-4118-BC75-9CE27D49C550}"/>
+                <a16:creationId xmlns:a16="http://schemas.microsoft.com/office/drawing/2014/main" id="{618DDD53-BB38-4118-BC75-9CE27D49C550}"/>
               </a:ext>
             </a:extLst>
           </p:cNvPr>
@@ -325,7 +325,7 @@
           <p:cNvPr id="14340" name="Rectangle 4">
             <a:extLst>
               <a:ext uri="{FF2B5EF4-FFF2-40B4-BE49-F238E27FC236}">
-                <a16:creationId xmlns="" xmlns:a16="http://schemas.microsoft.com/office/drawing/2014/main" id="{6C03B6F7-B1AE-4118-ABA2-FFEC9B8F0E9C}"/>
+                <a16:creationId xmlns:a16="http://schemas.microsoft.com/office/drawing/2014/main" id="{6C03B6F7-B1AE-4118-ABA2-FFEC9B8F0E9C}"/>
               </a:ext>
             </a:extLst>
           </p:cNvPr>
@@ -355,7 +355,7 @@
           </a:ln>
           <a:extLst>
             <a:ext uri="{909E8E84-426E-40DD-AFC4-6F175D3DCCD1}">
-              <a14:hiddenFill xmlns="" xmlns:a14="http://schemas.microsoft.com/office/drawing/2010/main">
+              <a14:hiddenFill xmlns:a14="http://schemas.microsoft.com/office/drawing/2010/main">
                 <a:solidFill>
                   <a:srgbClr val="FFFFFF"/>
                 </a:solidFill>
@@ -369,7 +369,7 @@
           <p:cNvPr id="30725" name="Rectangle 5">
             <a:extLst>
               <a:ext uri="{FF2B5EF4-FFF2-40B4-BE49-F238E27FC236}">
-                <a16:creationId xmlns="" xmlns:a16="http://schemas.microsoft.com/office/drawing/2014/main" id="{646F5356-BDE8-43C1-9587-85323D02B191}"/>
+                <a16:creationId xmlns:a16="http://schemas.microsoft.com/office/drawing/2014/main" id="{646F5356-BDE8-43C1-9587-85323D02B191}"/>
               </a:ext>
             </a:extLst>
           </p:cNvPr>
@@ -446,7 +446,7 @@
           <p:cNvPr id="30726" name="Rectangle 6">
             <a:extLst>
               <a:ext uri="{FF2B5EF4-FFF2-40B4-BE49-F238E27FC236}">
-                <a16:creationId xmlns="" xmlns:a16="http://schemas.microsoft.com/office/drawing/2014/main" id="{89912C35-11A9-4DA7-8476-F1823F658CAA}"/>
+                <a16:creationId xmlns:a16="http://schemas.microsoft.com/office/drawing/2014/main" id="{89912C35-11A9-4DA7-8476-F1823F658CAA}"/>
               </a:ext>
             </a:extLst>
           </p:cNvPr>
@@ -500,7 +500,7 @@
           <p:cNvPr id="30727" name="Rectangle 7">
             <a:extLst>
               <a:ext uri="{FF2B5EF4-FFF2-40B4-BE49-F238E27FC236}">
-                <a16:creationId xmlns="" xmlns:a16="http://schemas.microsoft.com/office/drawing/2014/main" id="{7180ED79-CEC3-4FB9-B511-8597B20A0C10}"/>
+                <a16:creationId xmlns:a16="http://schemas.microsoft.com/office/drawing/2014/main" id="{7180ED79-CEC3-4FB9-B511-8597B20A0C10}"/>
               </a:ext>
             </a:extLst>
           </p:cNvPr>
@@ -597,7 +597,7 @@
           <p:cNvPr id="15362" name="Rectangle 7">
             <a:extLst>
               <a:ext uri="{FF2B5EF4-FFF2-40B4-BE49-F238E27FC236}">
-                <a16:creationId xmlns="" xmlns:a16="http://schemas.microsoft.com/office/drawing/2014/main" id="{FA4671F7-4D2C-4B1E-AED7-24676BE8B496}"/>
+                <a16:creationId xmlns:a16="http://schemas.microsoft.com/office/drawing/2014/main" id="{FA4671F7-4D2C-4B1E-AED7-24676BE8B496}"/>
               </a:ext>
             </a:extLst>
           </p:cNvPr>
@@ -613,14 +613,14 @@
           <a:ln/>
           <a:extLst>
             <a:ext uri="{909E8E84-426E-40DD-AFC4-6F175D3DCCD1}">
-              <a14:hiddenFill xmlns="" xmlns:a14="http://schemas.microsoft.com/office/drawing/2010/main">
+              <a14:hiddenFill xmlns:a14="http://schemas.microsoft.com/office/drawing/2010/main">
                 <a:solidFill>
                   <a:srgbClr val="FFFFFF"/>
                 </a:solidFill>
               </a14:hiddenFill>
             </a:ext>
             <a:ext uri="{91240B29-F687-4F45-9708-019B960494DF}">
-              <a14:hiddenLine xmlns="" xmlns:a14="http://schemas.microsoft.com/office/drawing/2010/main" w="9525">
+              <a14:hiddenLine xmlns:a14="http://schemas.microsoft.com/office/drawing/2010/main" w="9525">
                 <a:solidFill>
                   <a:srgbClr val="000000"/>
                 </a:solidFill>
@@ -751,7 +751,7 @@
           <p:cNvPr id="15363" name="Rectangle 2">
             <a:extLst>
               <a:ext uri="{FF2B5EF4-FFF2-40B4-BE49-F238E27FC236}">
-                <a16:creationId xmlns="" xmlns:a16="http://schemas.microsoft.com/office/drawing/2014/main" id="{D8E83BD0-7AE4-4323-9047-FC368929C520}"/>
+                <a16:creationId xmlns:a16="http://schemas.microsoft.com/office/drawing/2014/main" id="{D8E83BD0-7AE4-4323-9047-FC368929C520}"/>
               </a:ext>
             </a:extLst>
           </p:cNvPr>
@@ -771,7 +771,7 @@
           <p:cNvPr id="15364" name="Rectangle 3">
             <a:extLst>
               <a:ext uri="{FF2B5EF4-FFF2-40B4-BE49-F238E27FC236}">
-                <a16:creationId xmlns="" xmlns:a16="http://schemas.microsoft.com/office/drawing/2014/main" id="{FDECF5EC-C5EC-4723-8F4F-A75A20018F65}"/>
+                <a16:creationId xmlns:a16="http://schemas.microsoft.com/office/drawing/2014/main" id="{FDECF5EC-C5EC-4723-8F4F-A75A20018F65}"/>
               </a:ext>
             </a:extLst>
           </p:cNvPr>
@@ -787,14 +787,14 @@
           <a:ln/>
           <a:extLst>
             <a:ext uri="{909E8E84-426E-40DD-AFC4-6F175D3DCCD1}">
-              <a14:hiddenFill xmlns="" xmlns:a14="http://schemas.microsoft.com/office/drawing/2010/main">
+              <a14:hiddenFill xmlns:a14="http://schemas.microsoft.com/office/drawing/2010/main">
                 <a:solidFill>
                   <a:srgbClr val="FFFFFF"/>
                 </a:solidFill>
               </a14:hiddenFill>
             </a:ext>
             <a:ext uri="{91240B29-F687-4F45-9708-019B960494DF}">
-              <a14:hiddenLine xmlns="" xmlns:a14="http://schemas.microsoft.com/office/drawing/2010/main" w="9525">
+              <a14:hiddenLine xmlns:a14="http://schemas.microsoft.com/office/drawing/2010/main" w="9525">
                 <a:solidFill>
                   <a:srgbClr val="000000"/>
                 </a:solidFill>
@@ -817,7 +817,7 @@
     </p:spTree>
     <p:extLst>
       <p:ext uri="{BB962C8B-B14F-4D97-AF65-F5344CB8AC3E}">
-        <p14:creationId xmlns="" xmlns:p14="http://schemas.microsoft.com/office/powerpoint/2010/main" val="1950814835"/>
+        <p14:creationId xmlns:p14="http://schemas.microsoft.com/office/powerpoint/2010/main" val="1950814835"/>
       </p:ext>
     </p:extLst>
   </p:cSld>
@@ -847,7 +847,7 @@
     </p:spTree>
     <p:extLst>
       <p:ext uri="{BB962C8B-B14F-4D97-AF65-F5344CB8AC3E}">
-        <p14:creationId xmlns="" xmlns:p14="http://schemas.microsoft.com/office/powerpoint/2010/main" val="2719101752"/>
+        <p14:creationId xmlns:p14="http://schemas.microsoft.com/office/powerpoint/2010/main" val="2719101752"/>
       </p:ext>
     </p:extLst>
   </p:cSld>
@@ -932,7 +932,7 @@
     </p:spTree>
     <p:extLst>
       <p:ext uri="{BB962C8B-B14F-4D97-AF65-F5344CB8AC3E}">
-        <p14:creationId xmlns="" xmlns:p14="http://schemas.microsoft.com/office/powerpoint/2010/main" val="1632278876"/>
+        <p14:creationId xmlns:p14="http://schemas.microsoft.com/office/powerpoint/2010/main" val="1632278876"/>
       </p:ext>
     </p:extLst>
   </p:cSld>
@@ -1017,7 +1017,7 @@
     </p:spTree>
     <p:extLst>
       <p:ext uri="{BB962C8B-B14F-4D97-AF65-F5344CB8AC3E}">
-        <p14:creationId xmlns="" xmlns:p14="http://schemas.microsoft.com/office/powerpoint/2010/main" val="1632278876"/>
+        <p14:creationId xmlns:p14="http://schemas.microsoft.com/office/powerpoint/2010/main" val="1632278876"/>
       </p:ext>
     </p:extLst>
   </p:cSld>
@@ -1102,7 +1102,7 @@
     </p:spTree>
     <p:extLst>
       <p:ext uri="{BB962C8B-B14F-4D97-AF65-F5344CB8AC3E}">
-        <p14:creationId xmlns="" xmlns:p14="http://schemas.microsoft.com/office/powerpoint/2010/main" val="1632278876"/>
+        <p14:creationId xmlns:p14="http://schemas.microsoft.com/office/powerpoint/2010/main" val="1632278876"/>
       </p:ext>
     </p:extLst>
   </p:cSld>
@@ -1142,7 +1142,7 @@
           <p:cNvPr id="2" name="Picture 1" descr="Chart, background pattern&#10;&#10;Description automatically generated">
             <a:extLst>
               <a:ext uri="{FF2B5EF4-FFF2-40B4-BE49-F238E27FC236}">
-                <a16:creationId xmlns="" xmlns:a16="http://schemas.microsoft.com/office/drawing/2014/main" id="{F3386FAC-ADFA-41EF-9C49-66952E35CA9C}"/>
+                <a16:creationId xmlns:a16="http://schemas.microsoft.com/office/drawing/2014/main" id="{F3386FAC-ADFA-41EF-9C49-66952E35CA9C}"/>
               </a:ext>
             </a:extLst>
           </p:cNvPr>
@@ -1155,7 +1155,7 @@
           <a:blip r:embed="rId2">
             <a:extLst>
               <a:ext uri="{28A0092B-C50C-407E-A947-70E740481C1C}">
-                <a14:useLocalDpi xmlns="" xmlns:a14="http://schemas.microsoft.com/office/drawing/2010/main" val="0"/>
+                <a14:useLocalDpi xmlns:a14="http://schemas.microsoft.com/office/drawing/2010/main" val="0"/>
               </a:ext>
             </a:extLst>
           </a:blip>
@@ -1177,7 +1177,7 @@
           <p:cNvPr id="19" name="Text Placeholder 18">
             <a:extLst>
               <a:ext uri="{FF2B5EF4-FFF2-40B4-BE49-F238E27FC236}">
-                <a16:creationId xmlns="" xmlns:a16="http://schemas.microsoft.com/office/drawing/2014/main" id="{69BE3FD0-1382-4F0E-A01F-F6C205E7DCDC}"/>
+                <a16:creationId xmlns:a16="http://schemas.microsoft.com/office/drawing/2014/main" id="{69BE3FD0-1382-4F0E-A01F-F6C205E7DCDC}"/>
               </a:ext>
             </a:extLst>
           </p:cNvPr>
@@ -1236,7 +1236,7 @@
           <p:cNvPr id="7" name="Rectangle 2">
             <a:extLst>
               <a:ext uri="{FF2B5EF4-FFF2-40B4-BE49-F238E27FC236}">
-                <a16:creationId xmlns="" xmlns:a16="http://schemas.microsoft.com/office/drawing/2014/main" id="{2E0BC0C9-E1C8-43B4-B02D-558783360CD4}"/>
+                <a16:creationId xmlns:a16="http://schemas.microsoft.com/office/drawing/2014/main" id="{2E0BC0C9-E1C8-43B4-B02D-558783360CD4}"/>
               </a:ext>
             </a:extLst>
           </p:cNvPr>
@@ -1281,7 +1281,7 @@
     </p:spTree>
     <p:extLst>
       <p:ext uri="{BB962C8B-B14F-4D97-AF65-F5344CB8AC3E}">
-        <p14:creationId xmlns="" xmlns:p14="http://schemas.microsoft.com/office/powerpoint/2010/main" val="1440679267"/>
+        <p14:creationId xmlns:p14="http://schemas.microsoft.com/office/powerpoint/2010/main" val="1440679267"/>
       </p:ext>
     </p:extLst>
   </p:cSld>
@@ -1290,7 +1290,7 @@
   </p:clrMapOvr>
   <p:extLst>
     <p:ext uri="{DCECCB84-F9BA-43D5-87BE-67443E8EF086}">
-      <p15:sldGuideLst xmlns="" xmlns:p15="http://schemas.microsoft.com/office/powerpoint/2012/main">
+      <p15:sldGuideLst xmlns:p15="http://schemas.microsoft.com/office/powerpoint/2012/main">
         <p15:guide id="1" pos="2808" userDrawn="1">
           <p15:clr>
             <a:srgbClr val="FBAE40"/>
@@ -1345,7 +1345,7 @@
             <a:fld id="{50A1B9BC-7BE7-4893-90FD-CC95830FD8F2}" type="datetimeFigureOut">
               <a:rPr lang="en-US" smtClean="0"/>
               <a:pPr/>
-              <a:t>3/8/2021</a:t>
+              <a:t>3/8/21</a:t>
             </a:fld>
             <a:endParaRPr lang="en-US" dirty="0"/>
           </a:p>
@@ -1397,7 +1397,7 @@
     </p:spTree>
     <p:extLst>
       <p:ext uri="{BB962C8B-B14F-4D97-AF65-F5344CB8AC3E}">
-        <p14:creationId xmlns="" xmlns:p14="http://schemas.microsoft.com/office/powerpoint/2010/main" val="4137841689"/>
+        <p14:creationId xmlns:p14="http://schemas.microsoft.com/office/powerpoint/2010/main" val="4137841689"/>
       </p:ext>
     </p:extLst>
   </p:cSld>
@@ -1437,7 +1437,7 @@
           <p:cNvPr id="3" name="Picture 2" descr="Chart, background pattern&#10;&#10;Description automatically generated">
             <a:extLst>
               <a:ext uri="{FF2B5EF4-FFF2-40B4-BE49-F238E27FC236}">
-                <a16:creationId xmlns="" xmlns:a16="http://schemas.microsoft.com/office/drawing/2014/main" id="{E9914566-E790-44E9-BF0F-0D38A423F962}"/>
+                <a16:creationId xmlns:a16="http://schemas.microsoft.com/office/drawing/2014/main" id="{E9914566-E790-44E9-BF0F-0D38A423F962}"/>
               </a:ext>
             </a:extLst>
           </p:cNvPr>
@@ -1450,7 +1450,7 @@
           <a:blip r:embed="rId2">
             <a:extLst>
               <a:ext uri="{28A0092B-C50C-407E-A947-70E740481C1C}">
-                <a14:useLocalDpi xmlns="" xmlns:a14="http://schemas.microsoft.com/office/drawing/2010/main" val="0"/>
+                <a14:useLocalDpi xmlns:a14="http://schemas.microsoft.com/office/drawing/2010/main" val="0"/>
               </a:ext>
             </a:extLst>
           </a:blip>
@@ -1472,7 +1472,7 @@
           <p:cNvPr id="16" name="Text Placeholder 15">
             <a:extLst>
               <a:ext uri="{FF2B5EF4-FFF2-40B4-BE49-F238E27FC236}">
-                <a16:creationId xmlns="" xmlns:a16="http://schemas.microsoft.com/office/drawing/2014/main" id="{8498B63D-F60C-4A9D-8D3E-0C7CD748FEDE}"/>
+                <a16:creationId xmlns:a16="http://schemas.microsoft.com/office/drawing/2014/main" id="{8498B63D-F60C-4A9D-8D3E-0C7CD748FEDE}"/>
               </a:ext>
             </a:extLst>
           </p:cNvPr>
@@ -1521,7 +1521,7 @@
           <p:cNvPr id="14" name="Picture Placeholder 13">
             <a:extLst>
               <a:ext uri="{FF2B5EF4-FFF2-40B4-BE49-F238E27FC236}">
-                <a16:creationId xmlns="" xmlns:a16="http://schemas.microsoft.com/office/drawing/2014/main" id="{9B1932CF-F265-4AEE-8704-F42C01AFB479}"/>
+                <a16:creationId xmlns:a16="http://schemas.microsoft.com/office/drawing/2014/main" id="{9B1932CF-F265-4AEE-8704-F42C01AFB479}"/>
               </a:ext>
             </a:extLst>
           </p:cNvPr>
@@ -1560,7 +1560,7 @@
           <p:cNvPr id="2" name="Title 1">
             <a:extLst>
               <a:ext uri="{FF2B5EF4-FFF2-40B4-BE49-F238E27FC236}">
-                <a16:creationId xmlns="" xmlns:a16="http://schemas.microsoft.com/office/drawing/2014/main" id="{891853E6-9C06-4DC2-B8A4-681C3D34BE75}"/>
+                <a16:creationId xmlns:a16="http://schemas.microsoft.com/office/drawing/2014/main" id="{891853E6-9C06-4DC2-B8A4-681C3D34BE75}"/>
               </a:ext>
             </a:extLst>
           </p:cNvPr>
@@ -1606,7 +1606,7 @@
     </p:spTree>
     <p:extLst>
       <p:ext uri="{BB962C8B-B14F-4D97-AF65-F5344CB8AC3E}">
-        <p14:creationId xmlns="" xmlns:p14="http://schemas.microsoft.com/office/powerpoint/2010/main" val="3104946878"/>
+        <p14:creationId xmlns:p14="http://schemas.microsoft.com/office/powerpoint/2010/main" val="3104946878"/>
       </p:ext>
     </p:extLst>
   </p:cSld>
@@ -1646,7 +1646,7 @@
           <p:cNvPr id="3" name="Picture 2" descr="Chart, background pattern&#10;&#10;Description automatically generated">
             <a:extLst>
               <a:ext uri="{FF2B5EF4-FFF2-40B4-BE49-F238E27FC236}">
-                <a16:creationId xmlns="" xmlns:a16="http://schemas.microsoft.com/office/drawing/2014/main" id="{B4F28166-FA93-42F3-90D5-A5BBE10D86FE}"/>
+                <a16:creationId xmlns:a16="http://schemas.microsoft.com/office/drawing/2014/main" id="{B4F28166-FA93-42F3-90D5-A5BBE10D86FE}"/>
               </a:ext>
             </a:extLst>
           </p:cNvPr>
@@ -1659,7 +1659,7 @@
           <a:blip r:embed="rId2">
             <a:extLst>
               <a:ext uri="{28A0092B-C50C-407E-A947-70E740481C1C}">
-                <a14:useLocalDpi xmlns="" xmlns:a14="http://schemas.microsoft.com/office/drawing/2010/main" val="0"/>
+                <a14:useLocalDpi xmlns:a14="http://schemas.microsoft.com/office/drawing/2010/main" val="0"/>
               </a:ext>
             </a:extLst>
           </a:blip>
@@ -1681,7 +1681,7 @@
           <p:cNvPr id="16" name="Text Placeholder 15">
             <a:extLst>
               <a:ext uri="{FF2B5EF4-FFF2-40B4-BE49-F238E27FC236}">
-                <a16:creationId xmlns="" xmlns:a16="http://schemas.microsoft.com/office/drawing/2014/main" id="{8498B63D-F60C-4A9D-8D3E-0C7CD748FEDE}"/>
+                <a16:creationId xmlns:a16="http://schemas.microsoft.com/office/drawing/2014/main" id="{8498B63D-F60C-4A9D-8D3E-0C7CD748FEDE}"/>
               </a:ext>
             </a:extLst>
           </p:cNvPr>
@@ -1730,7 +1730,7 @@
           <p:cNvPr id="8" name="Picture Placeholder 13">
             <a:extLst>
               <a:ext uri="{FF2B5EF4-FFF2-40B4-BE49-F238E27FC236}">
-                <a16:creationId xmlns="" xmlns:a16="http://schemas.microsoft.com/office/drawing/2014/main" id="{89E410BA-B0FE-4F0E-8BE5-D33CC016635B}"/>
+                <a16:creationId xmlns:a16="http://schemas.microsoft.com/office/drawing/2014/main" id="{89E410BA-B0FE-4F0E-8BE5-D33CC016635B}"/>
               </a:ext>
             </a:extLst>
           </p:cNvPr>
@@ -1771,7 +1771,7 @@
           <p:cNvPr id="9" name="Picture Placeholder 13">
             <a:extLst>
               <a:ext uri="{FF2B5EF4-FFF2-40B4-BE49-F238E27FC236}">
-                <a16:creationId xmlns="" xmlns:a16="http://schemas.microsoft.com/office/drawing/2014/main" id="{827A95C0-AE8D-46E1-9EF9-64504CBEF99E}"/>
+                <a16:creationId xmlns:a16="http://schemas.microsoft.com/office/drawing/2014/main" id="{827A95C0-AE8D-46E1-9EF9-64504CBEF99E}"/>
               </a:ext>
             </a:extLst>
           </p:cNvPr>
@@ -1812,7 +1812,7 @@
           <p:cNvPr id="7" name="Title 1">
             <a:extLst>
               <a:ext uri="{FF2B5EF4-FFF2-40B4-BE49-F238E27FC236}">
-                <a16:creationId xmlns="" xmlns:a16="http://schemas.microsoft.com/office/drawing/2014/main" id="{9AF0AFCE-F48A-4C35-9245-AFC319274E50}"/>
+                <a16:creationId xmlns:a16="http://schemas.microsoft.com/office/drawing/2014/main" id="{9AF0AFCE-F48A-4C35-9245-AFC319274E50}"/>
               </a:ext>
             </a:extLst>
           </p:cNvPr>
@@ -1858,7 +1858,7 @@
     </p:spTree>
     <p:extLst>
       <p:ext uri="{BB962C8B-B14F-4D97-AF65-F5344CB8AC3E}">
-        <p14:creationId xmlns="" xmlns:p14="http://schemas.microsoft.com/office/powerpoint/2010/main" val="1586680172"/>
+        <p14:creationId xmlns:p14="http://schemas.microsoft.com/office/powerpoint/2010/main" val="1586680172"/>
       </p:ext>
     </p:extLst>
   </p:cSld>
@@ -1867,7 +1867,7 @@
   </p:clrMapOvr>
   <p:extLst>
     <p:ext uri="{DCECCB84-F9BA-43D5-87BE-67443E8EF086}">
-      <p15:sldGuideLst xmlns="" xmlns:p15="http://schemas.microsoft.com/office/powerpoint/2012/main">
+      <p15:sldGuideLst xmlns:p15="http://schemas.microsoft.com/office/powerpoint/2012/main">
         <p15:guide id="1" orient="horz" pos="3672" userDrawn="1">
           <p15:clr>
             <a:srgbClr val="FBAE40"/>
@@ -1911,7 +1911,7 @@
           <p:cNvPr id="2" name="Picture 1" descr="Chart, background pattern&#10;&#10;Description automatically generated">
             <a:extLst>
               <a:ext uri="{FF2B5EF4-FFF2-40B4-BE49-F238E27FC236}">
-                <a16:creationId xmlns="" xmlns:a16="http://schemas.microsoft.com/office/drawing/2014/main" id="{570FCE13-E0EE-4C5A-BDB0-04E8FE4D216E}"/>
+                <a16:creationId xmlns:a16="http://schemas.microsoft.com/office/drawing/2014/main" id="{570FCE13-E0EE-4C5A-BDB0-04E8FE4D216E}"/>
               </a:ext>
             </a:extLst>
           </p:cNvPr>
@@ -1924,7 +1924,7 @@
           <a:blip r:embed="rId2">
             <a:extLst>
               <a:ext uri="{28A0092B-C50C-407E-A947-70E740481C1C}">
-                <a14:useLocalDpi xmlns="" xmlns:a14="http://schemas.microsoft.com/office/drawing/2010/main" val="0"/>
+                <a14:useLocalDpi xmlns:a14="http://schemas.microsoft.com/office/drawing/2010/main" val="0"/>
               </a:ext>
             </a:extLst>
           </a:blip>
@@ -1946,7 +1946,7 @@
           <p:cNvPr id="12" name="Text Placeholder 15">
             <a:extLst>
               <a:ext uri="{FF2B5EF4-FFF2-40B4-BE49-F238E27FC236}">
-                <a16:creationId xmlns="" xmlns:a16="http://schemas.microsoft.com/office/drawing/2014/main" id="{E8DBED36-2461-46D0-AF71-79E0064B3758}"/>
+                <a16:creationId xmlns:a16="http://schemas.microsoft.com/office/drawing/2014/main" id="{E8DBED36-2461-46D0-AF71-79E0064B3758}"/>
               </a:ext>
             </a:extLst>
           </p:cNvPr>
@@ -2007,7 +2007,7 @@
           <p:cNvPr id="3" name="Title 2">
             <a:extLst>
               <a:ext uri="{FF2B5EF4-FFF2-40B4-BE49-F238E27FC236}">
-                <a16:creationId xmlns="" xmlns:a16="http://schemas.microsoft.com/office/drawing/2014/main" id="{F23A82FA-1F05-4BAB-8768-A4575B1AEA6A}"/>
+                <a16:creationId xmlns:a16="http://schemas.microsoft.com/office/drawing/2014/main" id="{F23A82FA-1F05-4BAB-8768-A4575B1AEA6A}"/>
               </a:ext>
             </a:extLst>
           </p:cNvPr>
@@ -2056,20 +2056,20 @@
     </p:spTree>
     <p:extLst>
       <p:ext uri="{BB962C8B-B14F-4D97-AF65-F5344CB8AC3E}">
-        <p14:creationId xmlns="" xmlns:p14="http://schemas.microsoft.com/office/powerpoint/2010/main" val="172072613"/>
+        <p14:creationId xmlns:p14="http://schemas.microsoft.com/office/powerpoint/2010/main" val="172072613"/>
       </p:ext>
     </p:extLst>
   </p:cSld>
   <p:clrMapOvr>
     <a:overrideClrMapping bg1="lt1" tx1="dk1" bg2="lt2" tx2="dk2" accent1="accent1" accent2="accent2" accent3="accent3" accent4="accent4" accent5="accent5" accent6="accent6" hlink="hlink" folHlink="folHlink"/>
   </p:clrMapOvr>
-  <mc:AlternateContent xmlns:mc="http://schemas.openxmlformats.org/markup-compatibility/2006">
-    <mc:Choice xmlns="" xmlns:p14="http://schemas.microsoft.com/office/powerpoint/2010/main" Requires="p14">
+  <mc:AlternateContent xmlns:mc="http://schemas.openxmlformats.org/markup-compatibility/2006" xmlns:p14="http://schemas.microsoft.com/office/powerpoint/2010/main">
+    <mc:Choice Requires="p14">
       <p:transition spd="med" p14:dur="700">
         <p:fade/>
       </p:transition>
     </mc:Choice>
-    <mc:Fallback>
+    <mc:Fallback xmlns="">
       <p:transition spd="med">
         <p:fade/>
       </p:transition>
@@ -2077,7 +2077,7 @@
   </mc:AlternateContent>
   <p:extLst>
     <p:ext uri="{DCECCB84-F9BA-43D5-87BE-67443E8EF086}">
-      <p15:sldGuideLst xmlns="" xmlns:p15="http://schemas.microsoft.com/office/powerpoint/2012/main">
+      <p15:sldGuideLst xmlns:p15="http://schemas.microsoft.com/office/powerpoint/2012/main">
         <p15:guide id="1" orient="horz" pos="2160">
           <p15:clr>
             <a:srgbClr val="FBAE40"/>
@@ -2134,7 +2134,7 @@
           <p:cNvPr id="3" name="Picture 2" descr="Chart, background pattern&#10;&#10;Description automatically generated">
             <a:extLst>
               <a:ext uri="{FF2B5EF4-FFF2-40B4-BE49-F238E27FC236}">
-                <a16:creationId xmlns="" xmlns:a16="http://schemas.microsoft.com/office/drawing/2014/main" id="{D02F07F5-7B28-4FAB-AE64-9567EE73DE58}"/>
+                <a16:creationId xmlns:a16="http://schemas.microsoft.com/office/drawing/2014/main" id="{D02F07F5-7B28-4FAB-AE64-9567EE73DE58}"/>
               </a:ext>
             </a:extLst>
           </p:cNvPr>
@@ -2147,7 +2147,7 @@
           <a:blip r:embed="rId2">
             <a:extLst>
               <a:ext uri="{28A0092B-C50C-407E-A947-70E740481C1C}">
-                <a14:useLocalDpi xmlns="" xmlns:a14="http://schemas.microsoft.com/office/drawing/2010/main" val="0"/>
+                <a14:useLocalDpi xmlns:a14="http://schemas.microsoft.com/office/drawing/2010/main" val="0"/>
               </a:ext>
             </a:extLst>
           </a:blip>
@@ -2169,7 +2169,7 @@
           <p:cNvPr id="12" name="Text Placeholder 15">
             <a:extLst>
               <a:ext uri="{FF2B5EF4-FFF2-40B4-BE49-F238E27FC236}">
-                <a16:creationId xmlns="" xmlns:a16="http://schemas.microsoft.com/office/drawing/2014/main" id="{E8DBED36-2461-46D0-AF71-79E0064B3758}"/>
+                <a16:creationId xmlns:a16="http://schemas.microsoft.com/office/drawing/2014/main" id="{E8DBED36-2461-46D0-AF71-79E0064B3758}"/>
               </a:ext>
             </a:extLst>
           </p:cNvPr>
@@ -2230,7 +2230,7 @@
           <p:cNvPr id="2" name="Title 1">
             <a:extLst>
               <a:ext uri="{FF2B5EF4-FFF2-40B4-BE49-F238E27FC236}">
-                <a16:creationId xmlns="" xmlns:a16="http://schemas.microsoft.com/office/drawing/2014/main" id="{13E3504F-F7AC-4961-8027-04414EA28A76}"/>
+                <a16:creationId xmlns:a16="http://schemas.microsoft.com/office/drawing/2014/main" id="{13E3504F-F7AC-4961-8027-04414EA28A76}"/>
               </a:ext>
             </a:extLst>
           </p:cNvPr>
@@ -2283,20 +2283,20 @@
     </p:spTree>
     <p:extLst>
       <p:ext uri="{BB962C8B-B14F-4D97-AF65-F5344CB8AC3E}">
-        <p14:creationId xmlns="" xmlns:p14="http://schemas.microsoft.com/office/powerpoint/2010/main" val="2189876105"/>
+        <p14:creationId xmlns:p14="http://schemas.microsoft.com/office/powerpoint/2010/main" val="2189876105"/>
       </p:ext>
     </p:extLst>
   </p:cSld>
   <p:clrMapOvr>
     <a:masterClrMapping/>
   </p:clrMapOvr>
-  <mc:AlternateContent xmlns:mc="http://schemas.openxmlformats.org/markup-compatibility/2006">
-    <mc:Choice xmlns="" xmlns:p14="http://schemas.microsoft.com/office/powerpoint/2010/main" Requires="p14">
+  <mc:AlternateContent xmlns:mc="http://schemas.openxmlformats.org/markup-compatibility/2006" xmlns:p14="http://schemas.microsoft.com/office/powerpoint/2010/main">
+    <mc:Choice Requires="p14">
       <p:transition spd="med" p14:dur="700">
         <p:fade/>
       </p:transition>
     </mc:Choice>
-    <mc:Fallback>
+    <mc:Fallback xmlns="">
       <p:transition spd="med">
         <p:fade/>
       </p:transition>
@@ -2304,7 +2304,7 @@
   </mc:AlternateContent>
   <p:extLst>
     <p:ext uri="{DCECCB84-F9BA-43D5-87BE-67443E8EF086}">
-      <p15:sldGuideLst xmlns="" xmlns:p15="http://schemas.microsoft.com/office/powerpoint/2012/main">
+      <p15:sldGuideLst xmlns:p15="http://schemas.microsoft.com/office/powerpoint/2012/main">
         <p15:guide id="1" orient="horz" pos="2160">
           <p15:clr>
             <a:srgbClr val="FBAE40"/>
@@ -2361,7 +2361,7 @@
           <p:cNvPr id="3" name="Picture 2" descr="Shape, arrow&#10;&#10;Description automatically generated">
             <a:extLst>
               <a:ext uri="{FF2B5EF4-FFF2-40B4-BE49-F238E27FC236}">
-                <a16:creationId xmlns="" xmlns:a16="http://schemas.microsoft.com/office/drawing/2014/main" id="{028401E1-3B09-44F5-B61D-E811BC24E22A}"/>
+                <a16:creationId xmlns:a16="http://schemas.microsoft.com/office/drawing/2014/main" id="{028401E1-3B09-44F5-B61D-E811BC24E22A}"/>
               </a:ext>
             </a:extLst>
           </p:cNvPr>
@@ -2375,7 +2375,7 @@
             <a:alphaModFix amt="35000"/>
             <a:extLst>
               <a:ext uri="{28A0092B-C50C-407E-A947-70E740481C1C}">
-                <a14:useLocalDpi xmlns="" xmlns:a14="http://schemas.microsoft.com/office/drawing/2010/main" val="0"/>
+                <a14:useLocalDpi xmlns:a14="http://schemas.microsoft.com/office/drawing/2010/main" val="0"/>
               </a:ext>
             </a:extLst>
           </a:blip>
@@ -2397,7 +2397,7 @@
           <p:cNvPr id="5" name="Title 1">
             <a:extLst>
               <a:ext uri="{FF2B5EF4-FFF2-40B4-BE49-F238E27FC236}">
-                <a16:creationId xmlns="" xmlns:a16="http://schemas.microsoft.com/office/drawing/2014/main" id="{3D9303A2-B30A-054C-B809-053B909E125F}"/>
+                <a16:creationId xmlns:a16="http://schemas.microsoft.com/office/drawing/2014/main" id="{3D9303A2-B30A-054C-B809-053B909E125F}"/>
               </a:ext>
             </a:extLst>
           </p:cNvPr>
@@ -2455,7 +2455,7 @@
           <p:cNvPr id="6" name="Text Placeholder 4">
             <a:extLst>
               <a:ext uri="{FF2B5EF4-FFF2-40B4-BE49-F238E27FC236}">
-                <a16:creationId xmlns="" xmlns:a16="http://schemas.microsoft.com/office/drawing/2014/main" id="{10F58DD1-3970-D84D-8040-EF33B0971D59}"/>
+                <a16:creationId xmlns:a16="http://schemas.microsoft.com/office/drawing/2014/main" id="{10F58DD1-3970-D84D-8040-EF33B0971D59}"/>
               </a:ext>
             </a:extLst>
           </p:cNvPr>
@@ -2512,20 +2512,20 @@
     </p:spTree>
     <p:extLst>
       <p:ext uri="{BB962C8B-B14F-4D97-AF65-F5344CB8AC3E}">
-        <p14:creationId xmlns="" xmlns:p14="http://schemas.microsoft.com/office/powerpoint/2010/main" val="3240882942"/>
+        <p14:creationId xmlns:p14="http://schemas.microsoft.com/office/powerpoint/2010/main" val="3240882942"/>
       </p:ext>
     </p:extLst>
   </p:cSld>
   <p:clrMapOvr>
     <a:masterClrMapping/>
   </p:clrMapOvr>
-  <mc:AlternateContent xmlns:mc="http://schemas.openxmlformats.org/markup-compatibility/2006">
-    <mc:Choice xmlns="" xmlns:p14="http://schemas.microsoft.com/office/powerpoint/2010/main" Requires="p14">
+  <mc:AlternateContent xmlns:mc="http://schemas.openxmlformats.org/markup-compatibility/2006" xmlns:p14="http://schemas.microsoft.com/office/powerpoint/2010/main">
+    <mc:Choice Requires="p14">
       <p:transition spd="med" p14:dur="700">
         <p:fade/>
       </p:transition>
     </mc:Choice>
-    <mc:Fallback>
+    <mc:Fallback xmlns="">
       <p:transition spd="med">
         <p:fade/>
       </p:transition>
@@ -2533,7 +2533,7 @@
   </mc:AlternateContent>
   <p:extLst>
     <p:ext uri="{DCECCB84-F9BA-43D5-87BE-67443E8EF086}">
-      <p15:sldGuideLst xmlns="" xmlns:p15="http://schemas.microsoft.com/office/powerpoint/2012/main">
+      <p15:sldGuideLst xmlns:p15="http://schemas.microsoft.com/office/powerpoint/2012/main">
         <p15:guide id="1" orient="horz" pos="2160">
           <p15:clr>
             <a:srgbClr val="FBAE40"/>
@@ -2590,7 +2590,7 @@
           <p:cNvPr id="14" name="Text Placeholder 4">
             <a:extLst>
               <a:ext uri="{FF2B5EF4-FFF2-40B4-BE49-F238E27FC236}">
-                <a16:creationId xmlns="" xmlns:a16="http://schemas.microsoft.com/office/drawing/2014/main" id="{1EEF53A4-35A6-4E43-B220-67DA381C5910}"/>
+                <a16:creationId xmlns:a16="http://schemas.microsoft.com/office/drawing/2014/main" id="{1EEF53A4-35A6-4E43-B220-67DA381C5910}"/>
               </a:ext>
             </a:extLst>
           </p:cNvPr>
@@ -2651,7 +2651,7 @@
           <p:cNvPr id="5" name="Title 1">
             <a:extLst>
               <a:ext uri="{FF2B5EF4-FFF2-40B4-BE49-F238E27FC236}">
-                <a16:creationId xmlns="" xmlns:a16="http://schemas.microsoft.com/office/drawing/2014/main" id="{07724906-4405-47F4-B533-7291B003B0A2}"/>
+                <a16:creationId xmlns:a16="http://schemas.microsoft.com/office/drawing/2014/main" id="{07724906-4405-47F4-B533-7291B003B0A2}"/>
               </a:ext>
             </a:extLst>
           </p:cNvPr>
@@ -2710,7 +2710,7 @@
           <p:cNvPr id="2" name="Picture 1" descr="Chart, background pattern&#10;&#10;Description automatically generated">
             <a:extLst>
               <a:ext uri="{FF2B5EF4-FFF2-40B4-BE49-F238E27FC236}">
-                <a16:creationId xmlns="" xmlns:a16="http://schemas.microsoft.com/office/drawing/2014/main" id="{F2674189-311A-4AD6-ACED-1AF38642799F}"/>
+                <a16:creationId xmlns:a16="http://schemas.microsoft.com/office/drawing/2014/main" id="{F2674189-311A-4AD6-ACED-1AF38642799F}"/>
               </a:ext>
             </a:extLst>
           </p:cNvPr>
@@ -2723,7 +2723,7 @@
           <a:blip r:embed="rId2">
             <a:extLst>
               <a:ext uri="{28A0092B-C50C-407E-A947-70E740481C1C}">
-                <a14:useLocalDpi xmlns="" xmlns:a14="http://schemas.microsoft.com/office/drawing/2010/main" val="0"/>
+                <a14:useLocalDpi xmlns:a14="http://schemas.microsoft.com/office/drawing/2010/main" val="0"/>
               </a:ext>
             </a:extLst>
           </a:blip>
@@ -2743,7 +2743,7 @@
     </p:spTree>
     <p:extLst>
       <p:ext uri="{BB962C8B-B14F-4D97-AF65-F5344CB8AC3E}">
-        <p14:creationId xmlns="" xmlns:p14="http://schemas.microsoft.com/office/powerpoint/2010/main" val="495523106"/>
+        <p14:creationId xmlns:p14="http://schemas.microsoft.com/office/powerpoint/2010/main" val="495523106"/>
       </p:ext>
     </p:extLst>
   </p:cSld>
@@ -2783,7 +2783,7 @@
           <p:cNvPr id="13" name="Title 1">
             <a:extLst>
               <a:ext uri="{FF2B5EF4-FFF2-40B4-BE49-F238E27FC236}">
-                <a16:creationId xmlns="" xmlns:a16="http://schemas.microsoft.com/office/drawing/2014/main" id="{BC00585D-E155-409A-899A-29BDF4E57FD3}"/>
+                <a16:creationId xmlns:a16="http://schemas.microsoft.com/office/drawing/2014/main" id="{BC00585D-E155-409A-899A-29BDF4E57FD3}"/>
               </a:ext>
             </a:extLst>
           </p:cNvPr>
@@ -2842,7 +2842,7 @@
           <p:cNvPr id="5" name="Text Placeholder 4">
             <a:extLst>
               <a:ext uri="{FF2B5EF4-FFF2-40B4-BE49-F238E27FC236}">
-                <a16:creationId xmlns="" xmlns:a16="http://schemas.microsoft.com/office/drawing/2014/main" id="{2D944D9B-AA15-4DB5-AE58-0FA514F6FE87}"/>
+                <a16:creationId xmlns:a16="http://schemas.microsoft.com/office/drawing/2014/main" id="{2D944D9B-AA15-4DB5-AE58-0FA514F6FE87}"/>
               </a:ext>
             </a:extLst>
           </p:cNvPr>
@@ -2903,7 +2903,7 @@
           <p:cNvPr id="2" name="Picture 1" descr="Chart, background pattern&#10;&#10;Description automatically generated">
             <a:extLst>
               <a:ext uri="{FF2B5EF4-FFF2-40B4-BE49-F238E27FC236}">
-                <a16:creationId xmlns="" xmlns:a16="http://schemas.microsoft.com/office/drawing/2014/main" id="{75AA916B-1CCB-46CB-9D3B-BAF329AD02FA}"/>
+                <a16:creationId xmlns:a16="http://schemas.microsoft.com/office/drawing/2014/main" id="{75AA916B-1CCB-46CB-9D3B-BAF329AD02FA}"/>
               </a:ext>
             </a:extLst>
           </p:cNvPr>
@@ -2916,7 +2916,7 @@
           <a:blip r:embed="rId2">
             <a:extLst>
               <a:ext uri="{28A0092B-C50C-407E-A947-70E740481C1C}">
-                <a14:useLocalDpi xmlns="" xmlns:a14="http://schemas.microsoft.com/office/drawing/2010/main" val="0"/>
+                <a14:useLocalDpi xmlns:a14="http://schemas.microsoft.com/office/drawing/2010/main" val="0"/>
               </a:ext>
             </a:extLst>
           </a:blip>
@@ -2936,7 +2936,7 @@
     </p:spTree>
     <p:extLst>
       <p:ext uri="{BB962C8B-B14F-4D97-AF65-F5344CB8AC3E}">
-        <p14:creationId xmlns="" xmlns:p14="http://schemas.microsoft.com/office/powerpoint/2010/main" val="2499009600"/>
+        <p14:creationId xmlns:p14="http://schemas.microsoft.com/office/powerpoint/2010/main" val="2499009600"/>
       </p:ext>
     </p:extLst>
   </p:cSld>
@@ -2976,7 +2976,7 @@
           <p:cNvPr id="22" name="Text Placeholder 21">
             <a:extLst>
               <a:ext uri="{FF2B5EF4-FFF2-40B4-BE49-F238E27FC236}">
-                <a16:creationId xmlns="" xmlns:a16="http://schemas.microsoft.com/office/drawing/2014/main" id="{CC31B5EA-A920-4B2A-8F05-3C688980E26F}"/>
+                <a16:creationId xmlns:a16="http://schemas.microsoft.com/office/drawing/2014/main" id="{CC31B5EA-A920-4B2A-8F05-3C688980E26F}"/>
               </a:ext>
             </a:extLst>
           </p:cNvPr>
@@ -3086,7 +3086,7 @@
           <p:cNvPr id="16" name="Picture Placeholder 15">
             <a:extLst>
               <a:ext uri="{FF2B5EF4-FFF2-40B4-BE49-F238E27FC236}">
-                <a16:creationId xmlns="" xmlns:a16="http://schemas.microsoft.com/office/drawing/2014/main" id="{FE42B32E-80DC-4AC0-B306-CE8E5CCD934F}"/>
+                <a16:creationId xmlns:a16="http://schemas.microsoft.com/office/drawing/2014/main" id="{FE42B32E-80DC-4AC0-B306-CE8E5CCD934F}"/>
               </a:ext>
             </a:extLst>
           </p:cNvPr>
@@ -3132,7 +3132,7 @@
           <p:cNvPr id="20" name="Picture Placeholder 15">
             <a:extLst>
               <a:ext uri="{FF2B5EF4-FFF2-40B4-BE49-F238E27FC236}">
-                <a16:creationId xmlns="" xmlns:a16="http://schemas.microsoft.com/office/drawing/2014/main" id="{A4E97807-A99D-4012-BE47-7B3C54B502FA}"/>
+                <a16:creationId xmlns:a16="http://schemas.microsoft.com/office/drawing/2014/main" id="{A4E97807-A99D-4012-BE47-7B3C54B502FA}"/>
               </a:ext>
             </a:extLst>
           </p:cNvPr>
@@ -3178,7 +3178,7 @@
           <p:cNvPr id="21" name="Picture Placeholder 15">
             <a:extLst>
               <a:ext uri="{FF2B5EF4-FFF2-40B4-BE49-F238E27FC236}">
-                <a16:creationId xmlns="" xmlns:a16="http://schemas.microsoft.com/office/drawing/2014/main" id="{31025974-D850-4FC0-B6B0-BBF7DFCE1ECE}"/>
+                <a16:creationId xmlns:a16="http://schemas.microsoft.com/office/drawing/2014/main" id="{31025974-D850-4FC0-B6B0-BBF7DFCE1ECE}"/>
               </a:ext>
             </a:extLst>
           </p:cNvPr>
@@ -3224,7 +3224,7 @@
           <p:cNvPr id="19" name="Text Placeholder 4">
             <a:extLst>
               <a:ext uri="{FF2B5EF4-FFF2-40B4-BE49-F238E27FC236}">
-                <a16:creationId xmlns="" xmlns:a16="http://schemas.microsoft.com/office/drawing/2014/main" id="{3E65ED86-A26C-479A-8393-0BFDCBCD43F2}"/>
+                <a16:creationId xmlns:a16="http://schemas.microsoft.com/office/drawing/2014/main" id="{3E65ED86-A26C-479A-8393-0BFDCBCD43F2}"/>
               </a:ext>
             </a:extLst>
           </p:cNvPr>
@@ -3285,7 +3285,7 @@
           <p:cNvPr id="4" name="Title 1">
             <a:extLst>
               <a:ext uri="{FF2B5EF4-FFF2-40B4-BE49-F238E27FC236}">
-                <a16:creationId xmlns="" xmlns:a16="http://schemas.microsoft.com/office/drawing/2014/main" id="{F858EEFF-117E-4B86-B6B2-CD8F71AA8C4A}"/>
+                <a16:creationId xmlns:a16="http://schemas.microsoft.com/office/drawing/2014/main" id="{F858EEFF-117E-4B86-B6B2-CD8F71AA8C4A}"/>
               </a:ext>
             </a:extLst>
           </p:cNvPr>
@@ -3344,7 +3344,7 @@
           <p:cNvPr id="23" name="Text Placeholder 21">
             <a:extLst>
               <a:ext uri="{FF2B5EF4-FFF2-40B4-BE49-F238E27FC236}">
-                <a16:creationId xmlns="" xmlns:a16="http://schemas.microsoft.com/office/drawing/2014/main" id="{C073AF55-A66A-4112-A82D-E09A3D14EDBE}"/>
+                <a16:creationId xmlns:a16="http://schemas.microsoft.com/office/drawing/2014/main" id="{C073AF55-A66A-4112-A82D-E09A3D14EDBE}"/>
               </a:ext>
             </a:extLst>
           </p:cNvPr>
@@ -3454,7 +3454,7 @@
           <p:cNvPr id="24" name="Text Placeholder 21">
             <a:extLst>
               <a:ext uri="{FF2B5EF4-FFF2-40B4-BE49-F238E27FC236}">
-                <a16:creationId xmlns="" xmlns:a16="http://schemas.microsoft.com/office/drawing/2014/main" id="{CBC8787E-EB24-4D42-8555-6C6C11DD51B3}"/>
+                <a16:creationId xmlns:a16="http://schemas.microsoft.com/office/drawing/2014/main" id="{CBC8787E-EB24-4D42-8555-6C6C11DD51B3}"/>
               </a:ext>
             </a:extLst>
           </p:cNvPr>
@@ -3562,7 +3562,7 @@
     </p:spTree>
     <p:extLst>
       <p:ext uri="{BB962C8B-B14F-4D97-AF65-F5344CB8AC3E}">
-        <p14:creationId xmlns="" xmlns:p14="http://schemas.microsoft.com/office/powerpoint/2010/main" val="1422917410"/>
+        <p14:creationId xmlns:p14="http://schemas.microsoft.com/office/powerpoint/2010/main" val="1422917410"/>
       </p:ext>
     </p:extLst>
   </p:cSld>
@@ -3726,7 +3726,7 @@
             <a:fld id="{1D364696-E1F3-49EF-AEC8-730A16D9A23F}" type="datetimeFigureOut">
               <a:rPr lang="en-US" altLang="en-US" smtClean="0"/>
               <a:pPr/>
-              <a:t>3/8/2021</a:t>
+              <a:t>3/8/21</a:t>
             </a:fld>
             <a:endParaRPr lang="en-US" altLang="en-US" dirty="0"/>
           </a:p>
@@ -3816,7 +3816,7 @@
     </p:spTree>
     <p:extLst>
       <p:ext uri="{BB962C8B-B14F-4D97-AF65-F5344CB8AC3E}">
-        <p14:creationId xmlns="" xmlns:p14="http://schemas.microsoft.com/office/powerpoint/2010/main" val="3429690444"/>
+        <p14:creationId xmlns:p14="http://schemas.microsoft.com/office/powerpoint/2010/main" val="3429690444"/>
       </p:ext>
     </p:extLst>
   </p:cSld>
@@ -4146,7 +4146,7 @@
           <p:cNvPr id="3074" name="Rectangle 2">
             <a:extLst>
               <a:ext uri="{FF2B5EF4-FFF2-40B4-BE49-F238E27FC236}">
-                <a16:creationId xmlns="" xmlns:a16="http://schemas.microsoft.com/office/drawing/2014/main" id="{ED2DB031-9003-4F74-A88F-FE2A2ABABC72}"/>
+                <a16:creationId xmlns:a16="http://schemas.microsoft.com/office/drawing/2014/main" id="{ED2DB031-9003-4F74-A88F-FE2A2ABABC72}"/>
               </a:ext>
             </a:extLst>
           </p:cNvPr>
@@ -4176,15 +4176,7 @@
                   <a:schemeClr val="accent2"/>
                 </a:solidFill>
               </a:rPr>
-              <a:t>COVID-19 Impact on Navajo </a:t>
-            </a:r>
-            <a:r>
-              <a:rPr lang="en-US" altLang="en-US" sz="2800" b="1" dirty="0" smtClean="0">
-                <a:solidFill>
-                  <a:schemeClr val="accent2"/>
-                </a:solidFill>
-              </a:rPr>
-              <a:t>Nation</a:t>
+              <a:t>COVID-19 Impact on Navajo Nation</a:t>
             </a:r>
             <a:endParaRPr lang="en-US" altLang="en-US" sz="2800" b="1" dirty="0">
               <a:solidFill>
@@ -4200,7 +4192,7 @@
           <p:cNvPr id="3" name="Rectangle 2">
             <a:extLst>
               <a:ext uri="{FF2B5EF4-FFF2-40B4-BE49-F238E27FC236}">
-                <a16:creationId xmlns="" xmlns:a16="http://schemas.microsoft.com/office/drawing/2014/main" id="{ED2DB031-9003-4F74-A88F-FE2A2ABABC72}"/>
+                <a16:creationId xmlns:a16="http://schemas.microsoft.com/office/drawing/2014/main" id="{ED2DB031-9003-4F74-A88F-FE2A2ABABC72}"/>
               </a:ext>
             </a:extLst>
           </p:cNvPr>
@@ -4224,16 +4216,8 @@
           <a:lstStyle/>
           <a:p>
             <a:pPr eaLnBrk="1" hangingPunct="1"/>
-            <a:r>
-              <a:rPr lang="en-US" altLang="en-US" sz="6000" b="1" dirty="0" smtClean="0">
-                <a:solidFill>
-                  <a:schemeClr val="accent2"/>
-                </a:solidFill>
-              </a:rPr>
-              <a:t/>
-            </a:r>
             <a:br>
-              <a:rPr lang="en-US" altLang="en-US" sz="6000" b="1" dirty="0" smtClean="0">
+              <a:rPr lang="en-US" altLang="en-US" sz="6000" b="1" dirty="0">
                 <a:solidFill>
                   <a:schemeClr val="accent2"/>
                 </a:solidFill>
@@ -4275,20 +4259,20 @@
     </p:spTree>
     <p:extLst>
       <p:ext uri="{BB962C8B-B14F-4D97-AF65-F5344CB8AC3E}">
-        <p14:creationId xmlns="" xmlns:p14="http://schemas.microsoft.com/office/powerpoint/2010/main" val="1543265293"/>
+        <p14:creationId xmlns:p14="http://schemas.microsoft.com/office/powerpoint/2010/main" val="1543265293"/>
       </p:ext>
     </p:extLst>
   </p:cSld>
   <p:clrMapOvr>
     <a:masterClrMapping/>
   </p:clrMapOvr>
-  <mc:AlternateContent xmlns:mc="http://schemas.openxmlformats.org/markup-compatibility/2006">
-    <mc:Choice xmlns="" xmlns:p14="http://schemas.microsoft.com/office/powerpoint/2010/main" Requires="p14">
+  <mc:AlternateContent xmlns:mc="http://schemas.openxmlformats.org/markup-compatibility/2006" xmlns:p14="http://schemas.microsoft.com/office/powerpoint/2010/main">
+    <mc:Choice Requires="p14">
       <p:transition spd="med" p14:dur="700">
         <p:fade/>
       </p:transition>
     </mc:Choice>
-    <mc:Fallback>
+    <mc:Fallback xmlns="">
       <p:transition spd="med">
         <p:fade/>
       </p:transition>
@@ -4338,7 +4322,7 @@
           <p:cNvPr id="4" name="Title 3">
             <a:extLst>
               <a:ext uri="{FF2B5EF4-FFF2-40B4-BE49-F238E27FC236}">
-                <a16:creationId xmlns="" xmlns:a16="http://schemas.microsoft.com/office/drawing/2014/main" id="{048FBE6B-DC67-4E64-80F4-CADE978D2FE3}"/>
+                <a16:creationId xmlns:a16="http://schemas.microsoft.com/office/drawing/2014/main" id="{048FBE6B-DC67-4E64-80F4-CADE978D2FE3}"/>
               </a:ext>
             </a:extLst>
           </p:cNvPr>
@@ -4361,16 +4345,8 @@
           <a:p>
             <a:pPr algn="ctr"/>
             <a:r>
-              <a:rPr lang="en-US" altLang="en-US" dirty="0" smtClean="0"/>
-              <a:t>COVID-19 </a:t>
-            </a:r>
-            <a:r>
-              <a:rPr lang="en-US" altLang="en-US" dirty="0" smtClean="0"/>
-              <a:t>Impact on Navajo </a:t>
-            </a:r>
-            <a:r>
-              <a:rPr lang="en-US" altLang="en-US" dirty="0" smtClean="0"/>
-              <a:t>Nation</a:t>
+              <a:rPr lang="en-US" altLang="en-US" dirty="0"/>
+              <a:t>COVID-19 Impact on Navajo Nation</a:t>
             </a:r>
             <a:endParaRPr lang="en-US" dirty="0">
               <a:solidFill>
@@ -4410,7 +4386,7 @@
           <p:cNvPr id="4" name="Title 3">
             <a:extLst>
               <a:ext uri="{FF2B5EF4-FFF2-40B4-BE49-F238E27FC236}">
-                <a16:creationId xmlns="" xmlns:a16="http://schemas.microsoft.com/office/drawing/2014/main" id="{FD9E38B3-4686-8247-9625-49018D29F408}"/>
+                <a16:creationId xmlns:a16="http://schemas.microsoft.com/office/drawing/2014/main" id="{FD9E38B3-4686-8247-9625-49018D29F408}"/>
               </a:ext>
             </a:extLst>
           </p:cNvPr>
@@ -4440,7 +4416,7 @@
           <p:cNvPr id="3" name="Text Placeholder 2">
             <a:extLst>
               <a:ext uri="{FF2B5EF4-FFF2-40B4-BE49-F238E27FC236}">
-                <a16:creationId xmlns="" xmlns:a16="http://schemas.microsoft.com/office/drawing/2014/main" id="{17155E1D-F4AD-41A7-B948-E2D246CCFE8A}"/>
+                <a16:creationId xmlns:a16="http://schemas.microsoft.com/office/drawing/2014/main" id="{17155E1D-F4AD-41A7-B948-E2D246CCFE8A}"/>
               </a:ext>
             </a:extLst>
           </p:cNvPr>
@@ -4465,7 +4441,7 @@
           <p:cNvPr id="5" name="Title 3">
             <a:extLst>
               <a:ext uri="{FF2B5EF4-FFF2-40B4-BE49-F238E27FC236}">
-                <a16:creationId xmlns="" xmlns:a16="http://schemas.microsoft.com/office/drawing/2014/main" id="{048FBE6B-DC67-4E64-80F4-CADE978D2FE3}"/>
+                <a16:creationId xmlns:a16="http://schemas.microsoft.com/office/drawing/2014/main" id="{048FBE6B-DC67-4E64-80F4-CADE978D2FE3}"/>
               </a:ext>
             </a:extLst>
           </p:cNvPr>
@@ -4508,7 +4484,7 @@
               <a:defRPr/>
             </a:pPr>
             <a:r>
-              <a:rPr kumimoji="0" lang="en-US" altLang="en-US" sz="4000" b="1" i="0" u="none" strike="noStrike" kern="1200" cap="none" spc="-50" normalizeH="0" baseline="0" noProof="0" dirty="0" smtClean="0">
+              <a:rPr kumimoji="0" lang="en-US" altLang="en-US" sz="4000" b="1" i="0" u="none" strike="noStrike" kern="1200" cap="none" spc="-50" normalizeH="0" baseline="0" noProof="0" dirty="0">
                 <a:ln w="3175">
                   <a:noFill/>
                 </a:ln>
@@ -4522,41 +4498,7 @@
                 <a:ea typeface="+mn-ea"/>
                 <a:cs typeface="Segoe UI" pitchFamily="34" charset="0"/>
               </a:rPr>
-              <a:t>COVID-19 </a:t>
-            </a:r>
-            <a:r>
-              <a:rPr kumimoji="0" lang="en-US" altLang="en-US" sz="4000" b="1" i="0" u="none" strike="noStrike" kern="1200" cap="none" spc="-50" normalizeH="0" baseline="0" noProof="0" dirty="0" smtClean="0">
-                <a:ln w="3175">
-                  <a:noFill/>
-                </a:ln>
-                <a:solidFill>
-                  <a:schemeClr val="tx1"/>
-                </a:solidFill>
-                <a:effectLst/>
-                <a:uLnTx/>
-                <a:uFillTx/>
-                <a:latin typeface="+mj-lt"/>
-                <a:ea typeface="+mn-ea"/>
-                <a:cs typeface="Segoe UI" pitchFamily="34" charset="0"/>
-              </a:rPr>
-              <a:t>Impact on Navajo </a:t>
-            </a:r>
-            <a:r>
-              <a:rPr kumimoji="0" lang="en-US" altLang="en-US" sz="4000" b="1" i="0" u="none" strike="noStrike" kern="1200" cap="none" spc="-50" normalizeH="0" baseline="0" noProof="0" dirty="0" smtClean="0">
-                <a:ln w="3175">
-                  <a:noFill/>
-                </a:ln>
-                <a:solidFill>
-                  <a:schemeClr val="tx1"/>
-                </a:solidFill>
-                <a:effectLst/>
-                <a:uLnTx/>
-                <a:uFillTx/>
-                <a:latin typeface="+mj-lt"/>
-                <a:ea typeface="+mn-ea"/>
-                <a:cs typeface="Segoe UI" pitchFamily="34" charset="0"/>
-              </a:rPr>
-              <a:t>Nation</a:t>
+              <a:t>COVID-19 Impact on Navajo Nation</a:t>
             </a:r>
             <a:endParaRPr kumimoji="0" lang="en-US" sz="4000" b="1" i="0" u="none" strike="noStrike" kern="1200" cap="none" spc="-50" normalizeH="0" baseline="0" noProof="0" dirty="0">
               <a:ln w="3175">
@@ -4578,20 +4520,20 @@
     </p:spTree>
     <p:extLst>
       <p:ext uri="{BB962C8B-B14F-4D97-AF65-F5344CB8AC3E}">
-        <p14:creationId xmlns="" xmlns:p14="http://schemas.microsoft.com/office/powerpoint/2010/main" val="4244761525"/>
+        <p14:creationId xmlns:p14="http://schemas.microsoft.com/office/powerpoint/2010/main" val="4244761525"/>
       </p:ext>
     </p:extLst>
   </p:cSld>
   <p:clrMapOvr>
     <a:masterClrMapping/>
   </p:clrMapOvr>
-  <mc:AlternateContent xmlns:mc="http://schemas.openxmlformats.org/markup-compatibility/2006">
-    <mc:Choice xmlns="" xmlns:p14="http://schemas.microsoft.com/office/powerpoint/2010/main" Requires="p14">
+  <mc:AlternateContent xmlns:mc="http://schemas.openxmlformats.org/markup-compatibility/2006" xmlns:p14="http://schemas.microsoft.com/office/powerpoint/2010/main">
+    <mc:Choice Requires="p14">
       <p:transition spd="med" p14:dur="700">
         <p:fade/>
       </p:transition>
     </mc:Choice>
-    <mc:Fallback>
+    <mc:Fallback xmlns="">
       <p:transition spd="med">
         <p:fade/>
       </p:transition>
@@ -4641,7 +4583,7 @@
           <p:cNvPr id="5" name="Title 3">
             <a:extLst>
               <a:ext uri="{FF2B5EF4-FFF2-40B4-BE49-F238E27FC236}">
-                <a16:creationId xmlns="" xmlns:a16="http://schemas.microsoft.com/office/drawing/2014/main" id="{048FBE6B-DC67-4E64-80F4-CADE978D2FE3}"/>
+                <a16:creationId xmlns:a16="http://schemas.microsoft.com/office/drawing/2014/main" id="{048FBE6B-DC67-4E64-80F4-CADE978D2FE3}"/>
               </a:ext>
             </a:extLst>
           </p:cNvPr>
@@ -4664,16 +4606,8 @@
           <a:p>
             <a:pPr algn="ctr"/>
             <a:r>
-              <a:rPr lang="en-US" altLang="en-US" dirty="0" smtClean="0"/>
-              <a:t>COVID-19 </a:t>
-            </a:r>
-            <a:r>
-              <a:rPr lang="en-US" altLang="en-US" dirty="0" smtClean="0"/>
-              <a:t>Impact on Navajo </a:t>
-            </a:r>
-            <a:r>
-              <a:rPr lang="en-US" altLang="en-US" dirty="0" smtClean="0"/>
-              <a:t>Nation</a:t>
+              <a:rPr lang="en-US" altLang="en-US" dirty="0"/>
+              <a:t>COVID-19 Impact on Navajo Nation</a:t>
             </a:r>
             <a:endParaRPr lang="en-US" dirty="0">
               <a:solidFill>
@@ -4751,7 +4685,7 @@
           <p:cNvPr id="4" name="Title 3">
             <a:extLst>
               <a:ext uri="{FF2B5EF4-FFF2-40B4-BE49-F238E27FC236}">
-                <a16:creationId xmlns="" xmlns:a16="http://schemas.microsoft.com/office/drawing/2014/main" id="{048FBE6B-DC67-4E64-80F4-CADE978D2FE3}"/>
+                <a16:creationId xmlns:a16="http://schemas.microsoft.com/office/drawing/2014/main" id="{048FBE6B-DC67-4E64-80F4-CADE978D2FE3}"/>
               </a:ext>
             </a:extLst>
           </p:cNvPr>
@@ -4794,7 +4728,7 @@
               <a:defRPr/>
             </a:pPr>
             <a:r>
-              <a:rPr kumimoji="0" lang="en-US" altLang="en-US" sz="4000" b="1" i="0" u="none" strike="noStrike" kern="1200" cap="none" spc="-50" normalizeH="0" baseline="0" noProof="0" dirty="0" smtClean="0">
+              <a:rPr kumimoji="0" lang="en-US" altLang="en-US" sz="4000" b="1" i="0" u="none" strike="noStrike" kern="1200" cap="none" spc="-50" normalizeH="0" baseline="0" noProof="0" dirty="0">
                 <a:ln w="3175">
                   <a:noFill/>
                 </a:ln>
@@ -4808,41 +4742,7 @@
                 <a:ea typeface="+mn-ea"/>
                 <a:cs typeface="Segoe UI" pitchFamily="34" charset="0"/>
               </a:rPr>
-              <a:t>COVID-19 </a:t>
-            </a:r>
-            <a:r>
-              <a:rPr kumimoji="0" lang="en-US" altLang="en-US" sz="4000" b="1" i="0" u="none" strike="noStrike" kern="1200" cap="none" spc="-50" normalizeH="0" baseline="0" noProof="0" dirty="0" smtClean="0">
-                <a:ln w="3175">
-                  <a:noFill/>
-                </a:ln>
-                <a:solidFill>
-                  <a:schemeClr val="tx1"/>
-                </a:solidFill>
-                <a:effectLst/>
-                <a:uLnTx/>
-                <a:uFillTx/>
-                <a:latin typeface="+mj-lt"/>
-                <a:ea typeface="+mn-ea"/>
-                <a:cs typeface="Segoe UI" pitchFamily="34" charset="0"/>
-              </a:rPr>
-              <a:t>Impact on Navajo </a:t>
-            </a:r>
-            <a:r>
-              <a:rPr kumimoji="0" lang="en-US" altLang="en-US" sz="4000" b="1" i="0" u="none" strike="noStrike" kern="1200" cap="none" spc="-50" normalizeH="0" baseline="0" noProof="0" dirty="0" smtClean="0">
-                <a:ln w="3175">
-                  <a:noFill/>
-                </a:ln>
-                <a:solidFill>
-                  <a:schemeClr val="tx1"/>
-                </a:solidFill>
-                <a:effectLst/>
-                <a:uLnTx/>
-                <a:uFillTx/>
-                <a:latin typeface="+mj-lt"/>
-                <a:ea typeface="+mn-ea"/>
-                <a:cs typeface="Segoe UI" pitchFamily="34" charset="0"/>
-              </a:rPr>
-              <a:t>Nation</a:t>
+              <a:t>COVID-19 Impact on Navajo Nation</a:t>
             </a:r>
             <a:endParaRPr kumimoji="0" lang="en-US" sz="4000" b="1" i="0" u="none" strike="noStrike" kern="1200" cap="none" spc="-50" normalizeH="0" baseline="0" noProof="0" dirty="0">
               <a:ln w="3175">
@@ -4866,13 +4766,13 @@
   <p:clrMapOvr>
     <a:masterClrMapping/>
   </p:clrMapOvr>
-  <mc:AlternateContent xmlns:mc="http://schemas.openxmlformats.org/markup-compatibility/2006">
-    <mc:Choice xmlns="" xmlns:p14="http://schemas.microsoft.com/office/powerpoint/2010/main" Requires="p14">
+  <mc:AlternateContent xmlns:mc="http://schemas.openxmlformats.org/markup-compatibility/2006" xmlns:p14="http://schemas.microsoft.com/office/powerpoint/2010/main">
+    <mc:Choice Requires="p14">
       <p:transition spd="med" p14:dur="700">
         <p:fade/>
       </p:transition>
     </mc:Choice>
-    <mc:Fallback>
+    <mc:Fallback xmlns="">
       <p:transition spd="med">
         <p:fade/>
       </p:transition>
@@ -4922,7 +4822,7 @@
           <p:cNvPr id="4" name="Title 3">
             <a:extLst>
               <a:ext uri="{FF2B5EF4-FFF2-40B4-BE49-F238E27FC236}">
-                <a16:creationId xmlns="" xmlns:a16="http://schemas.microsoft.com/office/drawing/2014/main" id="{048FBE6B-DC67-4E64-80F4-CADE978D2FE3}"/>
+                <a16:creationId xmlns:a16="http://schemas.microsoft.com/office/drawing/2014/main" id="{048FBE6B-DC67-4E64-80F4-CADE978D2FE3}"/>
               </a:ext>
             </a:extLst>
           </p:cNvPr>
@@ -4945,16 +4845,8 @@
           <a:p>
             <a:pPr algn="ctr"/>
             <a:r>
-              <a:rPr lang="en-US" altLang="en-US" dirty="0" smtClean="0"/>
-              <a:t>COVID-19 </a:t>
-            </a:r>
-            <a:r>
-              <a:rPr lang="en-US" altLang="en-US" dirty="0" smtClean="0"/>
-              <a:t>Impact on Navajo </a:t>
-            </a:r>
-            <a:r>
-              <a:rPr lang="en-US" altLang="en-US" dirty="0" smtClean="0"/>
-              <a:t>Nation</a:t>
+              <a:rPr lang="en-US" altLang="en-US" dirty="0"/>
+              <a:t>COVID-19 Impact on Navajo Nation</a:t>
             </a:r>
             <a:endParaRPr lang="en-US" dirty="0">
               <a:solidFill>
@@ -5032,7 +4924,7 @@
           <p:cNvPr id="4" name="Title 3">
             <a:extLst>
               <a:ext uri="{FF2B5EF4-FFF2-40B4-BE49-F238E27FC236}">
-                <a16:creationId xmlns="" xmlns:a16="http://schemas.microsoft.com/office/drawing/2014/main" id="{048FBE6B-DC67-4E64-80F4-CADE978D2FE3}"/>
+                <a16:creationId xmlns:a16="http://schemas.microsoft.com/office/drawing/2014/main" id="{048FBE6B-DC67-4E64-80F4-CADE978D2FE3}"/>
               </a:ext>
             </a:extLst>
           </p:cNvPr>
@@ -5075,7 +4967,7 @@
               <a:defRPr/>
             </a:pPr>
             <a:r>
-              <a:rPr kumimoji="0" lang="en-US" altLang="en-US" sz="4000" b="1" i="0" u="none" strike="noStrike" kern="1200" cap="none" spc="-50" normalizeH="0" baseline="0" noProof="0" dirty="0" smtClean="0">
+              <a:rPr kumimoji="0" lang="en-US" altLang="en-US" sz="4000" b="1" i="0" u="none" strike="noStrike" kern="1200" cap="none" spc="-50" normalizeH="0" baseline="0" noProof="0" dirty="0">
                 <a:ln w="3175">
                   <a:noFill/>
                 </a:ln>
@@ -5089,41 +4981,7 @@
                 <a:ea typeface="+mn-ea"/>
                 <a:cs typeface="Segoe UI" pitchFamily="34" charset="0"/>
               </a:rPr>
-              <a:t>COVID-19 </a:t>
-            </a:r>
-            <a:r>
-              <a:rPr kumimoji="0" lang="en-US" altLang="en-US" sz="4000" b="1" i="0" u="none" strike="noStrike" kern="1200" cap="none" spc="-50" normalizeH="0" baseline="0" noProof="0" dirty="0" smtClean="0">
-                <a:ln w="3175">
-                  <a:noFill/>
-                </a:ln>
-                <a:solidFill>
-                  <a:schemeClr val="tx1"/>
-                </a:solidFill>
-                <a:effectLst/>
-                <a:uLnTx/>
-                <a:uFillTx/>
-                <a:latin typeface="+mj-lt"/>
-                <a:ea typeface="+mn-ea"/>
-                <a:cs typeface="Segoe UI" pitchFamily="34" charset="0"/>
-              </a:rPr>
-              <a:t>Impact on Navajo </a:t>
-            </a:r>
-            <a:r>
-              <a:rPr kumimoji="0" lang="en-US" altLang="en-US" sz="4000" b="1" i="0" u="none" strike="noStrike" kern="1200" cap="none" spc="-50" normalizeH="0" baseline="0" noProof="0" dirty="0" smtClean="0">
-                <a:ln w="3175">
-                  <a:noFill/>
-                </a:ln>
-                <a:solidFill>
-                  <a:schemeClr val="tx1"/>
-                </a:solidFill>
-                <a:effectLst/>
-                <a:uLnTx/>
-                <a:uFillTx/>
-                <a:latin typeface="+mj-lt"/>
-                <a:ea typeface="+mn-ea"/>
-                <a:cs typeface="Segoe UI" pitchFamily="34" charset="0"/>
-              </a:rPr>
-              <a:t>Nation</a:t>
+              <a:t>COVID-19 Impact on Navajo Nation</a:t>
             </a:r>
             <a:endParaRPr kumimoji="0" lang="en-US" sz="4000" b="1" i="0" u="none" strike="noStrike" kern="1200" cap="none" spc="-50" normalizeH="0" baseline="0" noProof="0" dirty="0">
               <a:ln w="3175">
@@ -5147,13 +5005,13 @@
   <p:clrMapOvr>
     <a:masterClrMapping/>
   </p:clrMapOvr>
-  <mc:AlternateContent xmlns:mc="http://schemas.openxmlformats.org/markup-compatibility/2006">
-    <mc:Choice xmlns="" xmlns:p14="http://schemas.microsoft.com/office/powerpoint/2010/main" Requires="p14">
+  <mc:AlternateContent xmlns:mc="http://schemas.openxmlformats.org/markup-compatibility/2006" xmlns:p14="http://schemas.microsoft.com/office/powerpoint/2010/main">
+    <mc:Choice Requires="p14">
       <p:transition spd="med" p14:dur="700">
         <p:fade/>
       </p:transition>
     </mc:Choice>
-    <mc:Fallback>
+    <mc:Fallback xmlns="">
       <p:transition spd="med">
         <p:fade/>
       </p:transition>
@@ -5222,7 +5080,7 @@
           <p:cNvPr id="4" name="Title 3">
             <a:extLst>
               <a:ext uri="{FF2B5EF4-FFF2-40B4-BE49-F238E27FC236}">
-                <a16:creationId xmlns="" xmlns:a16="http://schemas.microsoft.com/office/drawing/2014/main" id="{048FBE6B-DC67-4E64-80F4-CADE978D2FE3}"/>
+                <a16:creationId xmlns:a16="http://schemas.microsoft.com/office/drawing/2014/main" id="{048FBE6B-DC67-4E64-80F4-CADE978D2FE3}"/>
               </a:ext>
             </a:extLst>
           </p:cNvPr>
@@ -5265,7 +5123,7 @@
               <a:defRPr/>
             </a:pPr>
             <a:r>
-              <a:rPr kumimoji="0" lang="en-US" altLang="en-US" sz="4000" b="1" i="0" u="none" strike="noStrike" kern="1200" cap="none" spc="-50" normalizeH="0" baseline="0" noProof="0" dirty="0" smtClean="0">
+              <a:rPr kumimoji="0" lang="en-US" altLang="en-US" sz="4000" b="1" i="0" u="none" strike="noStrike" kern="1200" cap="none" spc="-50" normalizeH="0" baseline="0" noProof="0" dirty="0">
                 <a:ln w="3175">
                   <a:noFill/>
                 </a:ln>
@@ -5279,41 +5137,7 @@
                 <a:ea typeface="+mn-ea"/>
                 <a:cs typeface="Segoe UI" pitchFamily="34" charset="0"/>
               </a:rPr>
-              <a:t>COVID-19 </a:t>
-            </a:r>
-            <a:r>
-              <a:rPr kumimoji="0" lang="en-US" altLang="en-US" sz="4000" b="1" i="0" u="none" strike="noStrike" kern="1200" cap="none" spc="-50" normalizeH="0" baseline="0" noProof="0" dirty="0" smtClean="0">
-                <a:ln w="3175">
-                  <a:noFill/>
-                </a:ln>
-                <a:solidFill>
-                  <a:schemeClr val="accent2"/>
-                </a:solidFill>
-                <a:effectLst/>
-                <a:uLnTx/>
-                <a:uFillTx/>
-                <a:latin typeface="+mj-lt"/>
-                <a:ea typeface="+mn-ea"/>
-                <a:cs typeface="Segoe UI" pitchFamily="34" charset="0"/>
-              </a:rPr>
-              <a:t>Impact on Navajo </a:t>
-            </a:r>
-            <a:r>
-              <a:rPr kumimoji="0" lang="en-US" altLang="en-US" sz="4000" b="1" i="0" u="none" strike="noStrike" kern="1200" cap="none" spc="-50" normalizeH="0" baseline="0" noProof="0" dirty="0" smtClean="0">
-                <a:ln w="3175">
-                  <a:noFill/>
-                </a:ln>
-                <a:solidFill>
-                  <a:schemeClr val="accent2"/>
-                </a:solidFill>
-                <a:effectLst/>
-                <a:uLnTx/>
-                <a:uFillTx/>
-                <a:latin typeface="+mj-lt"/>
-                <a:ea typeface="+mn-ea"/>
-                <a:cs typeface="Segoe UI" pitchFamily="34" charset="0"/>
-              </a:rPr>
-              <a:t>Nation</a:t>
+              <a:t>COVID-19 Impact on Navajo Nation</a:t>
             </a:r>
             <a:endParaRPr kumimoji="0" lang="en-US" sz="4000" b="1" i="0" u="none" strike="noStrike" kern="1200" cap="none" spc="-50" normalizeH="0" baseline="0" noProof="0" dirty="0">
               <a:ln w="3175">
@@ -5400,7 +5224,7 @@
           <p:cNvPr id="4" name="Title 3">
             <a:extLst>
               <a:ext uri="{FF2B5EF4-FFF2-40B4-BE49-F238E27FC236}">
-                <a16:creationId xmlns="" xmlns:a16="http://schemas.microsoft.com/office/drawing/2014/main" id="{048FBE6B-DC67-4E64-80F4-CADE978D2FE3}"/>
+                <a16:creationId xmlns:a16="http://schemas.microsoft.com/office/drawing/2014/main" id="{048FBE6B-DC67-4E64-80F4-CADE978D2FE3}"/>
               </a:ext>
             </a:extLst>
           </p:cNvPr>
@@ -5443,7 +5267,7 @@
               <a:defRPr/>
             </a:pPr>
             <a:r>
-              <a:rPr kumimoji="0" lang="en-US" altLang="en-US" sz="4000" b="1" i="0" u="none" strike="noStrike" kern="1200" cap="none" spc="-50" normalizeH="0" baseline="0" noProof="0" dirty="0" smtClean="0">
+              <a:rPr kumimoji="0" lang="en-US" altLang="en-US" sz="4000" b="1" i="0" u="none" strike="noStrike" kern="1200" cap="none" spc="-50" normalizeH="0" baseline="0" noProof="0" dirty="0">
                 <a:ln w="3175">
                   <a:noFill/>
                 </a:ln>
@@ -5457,41 +5281,7 @@
                 <a:ea typeface="+mn-ea"/>
                 <a:cs typeface="Segoe UI" pitchFamily="34" charset="0"/>
               </a:rPr>
-              <a:t>COVID-19 </a:t>
-            </a:r>
-            <a:r>
-              <a:rPr kumimoji="0" lang="en-US" altLang="en-US" sz="4000" b="1" i="0" u="none" strike="noStrike" kern="1200" cap="none" spc="-50" normalizeH="0" baseline="0" noProof="0" dirty="0" smtClean="0">
-                <a:ln w="3175">
-                  <a:noFill/>
-                </a:ln>
-                <a:solidFill>
-                  <a:schemeClr val="accent2"/>
-                </a:solidFill>
-                <a:effectLst/>
-                <a:uLnTx/>
-                <a:uFillTx/>
-                <a:latin typeface="+mj-lt"/>
-                <a:ea typeface="+mn-ea"/>
-                <a:cs typeface="Segoe UI" pitchFamily="34" charset="0"/>
-              </a:rPr>
-              <a:t>Impact on Navajo </a:t>
-            </a:r>
-            <a:r>
-              <a:rPr kumimoji="0" lang="en-US" altLang="en-US" sz="4000" b="1" i="0" u="none" strike="noStrike" kern="1200" cap="none" spc="-50" normalizeH="0" baseline="0" noProof="0" dirty="0" smtClean="0">
-                <a:ln w="3175">
-                  <a:noFill/>
-                </a:ln>
-                <a:solidFill>
-                  <a:schemeClr val="accent2"/>
-                </a:solidFill>
-                <a:effectLst/>
-                <a:uLnTx/>
-                <a:uFillTx/>
-                <a:latin typeface="+mj-lt"/>
-                <a:ea typeface="+mn-ea"/>
-                <a:cs typeface="Segoe UI" pitchFamily="34" charset="0"/>
-              </a:rPr>
-              <a:t>Nation</a:t>
+              <a:t>COVID-19 Impact on Navajo Nation</a:t>
             </a:r>
             <a:endParaRPr kumimoji="0" lang="en-US" sz="4000" b="1" i="0" u="none" strike="noStrike" kern="1200" cap="none" spc="-50" normalizeH="0" baseline="0" noProof="0" dirty="0">
               <a:ln w="3175">
@@ -5578,7 +5368,7 @@
           <p:cNvPr id="5" name="Title 3">
             <a:extLst>
               <a:ext uri="{FF2B5EF4-FFF2-40B4-BE49-F238E27FC236}">
-                <a16:creationId xmlns="" xmlns:a16="http://schemas.microsoft.com/office/drawing/2014/main" id="{048FBE6B-DC67-4E64-80F4-CADE978D2FE3}"/>
+                <a16:creationId xmlns:a16="http://schemas.microsoft.com/office/drawing/2014/main" id="{048FBE6B-DC67-4E64-80F4-CADE978D2FE3}"/>
               </a:ext>
             </a:extLst>
           </p:cNvPr>
@@ -5621,7 +5411,7 @@
               <a:defRPr/>
             </a:pPr>
             <a:r>
-              <a:rPr kumimoji="0" lang="en-US" altLang="en-US" sz="4000" b="1" i="0" u="none" strike="noStrike" kern="1200" cap="none" spc="-50" normalizeH="0" baseline="0" noProof="0" dirty="0" smtClean="0">
+              <a:rPr kumimoji="0" lang="en-US" altLang="en-US" sz="4000" b="1" i="0" u="none" strike="noStrike" kern="1200" cap="none" spc="-50" normalizeH="0" baseline="0" noProof="0" dirty="0">
                 <a:ln w="3175">
                   <a:noFill/>
                 </a:ln>
@@ -5635,41 +5425,7 @@
                 <a:ea typeface="+mn-ea"/>
                 <a:cs typeface="Segoe UI" pitchFamily="34" charset="0"/>
               </a:rPr>
-              <a:t>COVID-19 </a:t>
-            </a:r>
-            <a:r>
-              <a:rPr kumimoji="0" lang="en-US" altLang="en-US" sz="4000" b="1" i="0" u="none" strike="noStrike" kern="1200" cap="none" spc="-50" normalizeH="0" baseline="0" noProof="0" dirty="0" smtClean="0">
-                <a:ln w="3175">
-                  <a:noFill/>
-                </a:ln>
-                <a:solidFill>
-                  <a:schemeClr val="tx1"/>
-                </a:solidFill>
-                <a:effectLst/>
-                <a:uLnTx/>
-                <a:uFillTx/>
-                <a:latin typeface="+mj-lt"/>
-                <a:ea typeface="+mn-ea"/>
-                <a:cs typeface="Segoe UI" pitchFamily="34" charset="0"/>
-              </a:rPr>
-              <a:t>Impact on Navajo </a:t>
-            </a:r>
-            <a:r>
-              <a:rPr kumimoji="0" lang="en-US" altLang="en-US" sz="4000" b="1" i="0" u="none" strike="noStrike" kern="1200" cap="none" spc="-50" normalizeH="0" baseline="0" noProof="0" dirty="0" smtClean="0">
-                <a:ln w="3175">
-                  <a:noFill/>
-                </a:ln>
-                <a:solidFill>
-                  <a:schemeClr val="tx1"/>
-                </a:solidFill>
-                <a:effectLst/>
-                <a:uLnTx/>
-                <a:uFillTx/>
-                <a:latin typeface="+mj-lt"/>
-                <a:ea typeface="+mn-ea"/>
-                <a:cs typeface="Segoe UI" pitchFamily="34" charset="0"/>
-              </a:rPr>
-              <a:t>Nation</a:t>
+              <a:t>COVID-19 Impact on Navajo Nation</a:t>
             </a:r>
             <a:endParaRPr kumimoji="0" lang="en-US" sz="4000" b="1" i="0" u="none" strike="noStrike" kern="1200" cap="none" spc="-50" normalizeH="0" baseline="0" noProof="0" dirty="0">
               <a:ln w="3175">
@@ -5693,13 +5449,13 @@
   <p:clrMapOvr>
     <a:masterClrMapping/>
   </p:clrMapOvr>
-  <mc:AlternateContent xmlns:mc="http://schemas.openxmlformats.org/markup-compatibility/2006">
-    <mc:Choice xmlns="" xmlns:p14="http://schemas.microsoft.com/office/powerpoint/2010/main" Requires="p14">
+  <mc:AlternateContent xmlns:mc="http://schemas.openxmlformats.org/markup-compatibility/2006" xmlns:p14="http://schemas.microsoft.com/office/powerpoint/2010/main">
+    <mc:Choice Requires="p14">
       <p:transition spd="med" p14:dur="700">
         <p:fade/>
       </p:transition>
     </mc:Choice>
-    <mc:Fallback>
+    <mc:Fallback xmlns="">
       <p:transition spd="med">
         <p:fade/>
       </p:transition>
@@ -5768,7 +5524,7 @@
           <p:cNvPr id="4" name="Title 3">
             <a:extLst>
               <a:ext uri="{FF2B5EF4-FFF2-40B4-BE49-F238E27FC236}">
-                <a16:creationId xmlns="" xmlns:a16="http://schemas.microsoft.com/office/drawing/2014/main" id="{048FBE6B-DC67-4E64-80F4-CADE978D2FE3}"/>
+                <a16:creationId xmlns:a16="http://schemas.microsoft.com/office/drawing/2014/main" id="{048FBE6B-DC67-4E64-80F4-CADE978D2FE3}"/>
               </a:ext>
             </a:extLst>
           </p:cNvPr>
@@ -5811,7 +5567,7 @@
               <a:defRPr/>
             </a:pPr>
             <a:r>
-              <a:rPr kumimoji="0" lang="en-US" altLang="en-US" sz="4000" b="1" i="0" u="none" strike="noStrike" kern="1200" cap="none" spc="-50" normalizeH="0" baseline="0" noProof="0" dirty="0" smtClean="0">
+              <a:rPr kumimoji="0" lang="en-US" altLang="en-US" sz="4000" b="1" i="0" u="none" strike="noStrike" kern="1200" cap="none" spc="-50" normalizeH="0" baseline="0" noProof="0" dirty="0">
                 <a:ln w="3175">
                   <a:noFill/>
                 </a:ln>
@@ -5825,41 +5581,7 @@
                 <a:ea typeface="+mn-ea"/>
                 <a:cs typeface="Segoe UI" pitchFamily="34" charset="0"/>
               </a:rPr>
-              <a:t>COVID-19 </a:t>
-            </a:r>
-            <a:r>
-              <a:rPr kumimoji="0" lang="en-US" altLang="en-US" sz="4000" b="1" i="0" u="none" strike="noStrike" kern="1200" cap="none" spc="-50" normalizeH="0" baseline="0" noProof="0" dirty="0" smtClean="0">
-                <a:ln w="3175">
-                  <a:noFill/>
-                </a:ln>
-                <a:solidFill>
-                  <a:schemeClr val="accent2"/>
-                </a:solidFill>
-                <a:effectLst/>
-                <a:uLnTx/>
-                <a:uFillTx/>
-                <a:latin typeface="+mj-lt"/>
-                <a:ea typeface="+mn-ea"/>
-                <a:cs typeface="Segoe UI" pitchFamily="34" charset="0"/>
-              </a:rPr>
-              <a:t>Impact on Navajo </a:t>
-            </a:r>
-            <a:r>
-              <a:rPr kumimoji="0" lang="en-US" altLang="en-US" sz="4000" b="1" i="0" u="none" strike="noStrike" kern="1200" cap="none" spc="-50" normalizeH="0" baseline="0" noProof="0" dirty="0" smtClean="0">
-                <a:ln w="3175">
-                  <a:noFill/>
-                </a:ln>
-                <a:solidFill>
-                  <a:schemeClr val="accent2"/>
-                </a:solidFill>
-                <a:effectLst/>
-                <a:uLnTx/>
-                <a:uFillTx/>
-                <a:latin typeface="+mj-lt"/>
-                <a:ea typeface="+mn-ea"/>
-                <a:cs typeface="Segoe UI" pitchFamily="34" charset="0"/>
-              </a:rPr>
-              <a:t>Nation</a:t>
+              <a:t>COVID-19 Impact on Navajo Nation</a:t>
             </a:r>
             <a:endParaRPr kumimoji="0" lang="en-US" sz="4000" b="1" i="0" u="none" strike="noStrike" kern="1200" cap="none" spc="-50" normalizeH="0" baseline="0" noProof="0" dirty="0">
               <a:ln w="3175">
@@ -5916,7 +5638,7 @@
           <p:cNvPr id="6" name="Title 5">
             <a:extLst>
               <a:ext uri="{FF2B5EF4-FFF2-40B4-BE49-F238E27FC236}">
-                <a16:creationId xmlns="" xmlns:a16="http://schemas.microsoft.com/office/drawing/2014/main" id="{C56504DE-4F83-437F-BDB6-306374C31C9C}"/>
+                <a16:creationId xmlns:a16="http://schemas.microsoft.com/office/drawing/2014/main" id="{C56504DE-4F83-437F-BDB6-306374C31C9C}"/>
               </a:ext>
             </a:extLst>
           </p:cNvPr>
@@ -5941,12 +5663,8 @@
           <a:p>
             <a:pPr algn="ctr"/>
             <a:r>
-              <a:rPr lang="en-US" altLang="en-US" sz="2800" dirty="0" smtClean="0"/>
-              <a:t>COVID-19 Impact on Navajo </a:t>
-            </a:r>
-            <a:r>
-              <a:rPr lang="en-US" altLang="en-US" sz="2800" dirty="0" smtClean="0"/>
-              <a:t>Nation</a:t>
+              <a:rPr lang="en-US" altLang="en-US" sz="2800" dirty="0"/>
+              <a:t>COVID-19 Impact on Navajo Nation</a:t>
             </a:r>
             <a:endParaRPr lang="en-US" sz="2800" dirty="0"/>
           </a:p>
@@ -5957,7 +5675,7 @@
           <p:cNvPr id="2" name="Text Placeholder 1">
             <a:extLst>
               <a:ext uri="{FF2B5EF4-FFF2-40B4-BE49-F238E27FC236}">
-                <a16:creationId xmlns="" xmlns:a16="http://schemas.microsoft.com/office/drawing/2014/main" id="{3F36812B-2065-4A2B-B59B-8957022687BC}"/>
+                <a16:creationId xmlns:a16="http://schemas.microsoft.com/office/drawing/2014/main" id="{3F36812B-2065-4A2B-B59B-8957022687BC}"/>
               </a:ext>
             </a:extLst>
           </p:cNvPr>
@@ -5987,7 +5705,7 @@
               <a:buNone/>
             </a:pPr>
             <a:r>
-              <a:rPr lang="en-US" altLang="en-US" sz="1800" dirty="0" smtClean="0"/>
+              <a:rPr lang="en-US" altLang="en-US" sz="1800" dirty="0"/>
               <a:t>Since January of 2020 Covid-19 has become a Global Pandemic </a:t>
             </a:r>
           </a:p>
@@ -5998,7 +5716,7 @@
               </a:spcAft>
               <a:buNone/>
             </a:pPr>
-            <a:endParaRPr lang="en-US" altLang="en-US" sz="1800" dirty="0" smtClean="0"/>
+            <a:endParaRPr lang="en-US" altLang="en-US" sz="1800" dirty="0"/>
           </a:p>
           <a:p>
             <a:pPr marL="0" indent="0" fontAlgn="auto">
@@ -6008,7 +5726,7 @@
               <a:buNone/>
             </a:pPr>
             <a:r>
-              <a:rPr lang="en-US" altLang="en-US" sz="1800" dirty="0" smtClean="0"/>
+              <a:rPr lang="en-US" altLang="en-US" sz="1800" dirty="0"/>
               <a:t>One of the hardest hit groups </a:t>
             </a:r>
           </a:p>
@@ -6020,7 +5738,7 @@
               <a:buNone/>
             </a:pPr>
             <a:r>
-              <a:rPr lang="en-US" altLang="en-US" sz="1800" dirty="0" smtClean="0"/>
+              <a:rPr lang="en-US" altLang="en-US" sz="1800" dirty="0"/>
               <a:t>people effected by the </a:t>
             </a:r>
           </a:p>
@@ -6032,7 +5750,7 @@
               <a:buNone/>
             </a:pPr>
             <a:r>
-              <a:rPr lang="en-US" altLang="en-US" sz="1800" dirty="0" smtClean="0"/>
+              <a:rPr lang="en-US" altLang="en-US" sz="1800" dirty="0"/>
               <a:t>pandemic in the United States </a:t>
             </a:r>
           </a:p>
@@ -6044,7 +5762,7 @@
               <a:buNone/>
             </a:pPr>
             <a:r>
-              <a:rPr lang="en-US" altLang="en-US" sz="1800" dirty="0" smtClean="0"/>
+              <a:rPr lang="en-US" altLang="en-US" sz="1800" dirty="0"/>
               <a:t>has been the Navajo Nation </a:t>
             </a:r>
           </a:p>
@@ -6056,63 +5774,9 @@
               <a:buNone/>
             </a:pPr>
             <a:r>
-              <a:rPr lang="en-US" altLang="en-US" sz="1800" dirty="0" smtClean="0"/>
+              <a:rPr lang="en-US" altLang="en-US" sz="1800" dirty="0"/>
               <a:t>Indian Tribe.  </a:t>
             </a:r>
-          </a:p>
-          <a:p>
-            <a:pPr marL="0" indent="0" fontAlgn="auto">
-              <a:spcAft>
-                <a:spcPts val="0"/>
-              </a:spcAft>
-              <a:buNone/>
-            </a:pPr>
-            <a:endParaRPr lang="en-US" altLang="en-US" sz="1800" b="1" dirty="0" smtClean="0">
-              <a:solidFill>
-                <a:schemeClr val="accent6">
-                  <a:lumMod val="50000"/>
-                </a:schemeClr>
-              </a:solidFill>
-            </a:endParaRPr>
-          </a:p>
-          <a:p>
-            <a:pPr marL="0" indent="0" fontAlgn="auto">
-              <a:spcAft>
-                <a:spcPts val="0"/>
-              </a:spcAft>
-              <a:buNone/>
-            </a:pPr>
-            <a:r>
-              <a:rPr lang="en-US" altLang="en-US" sz="1800" dirty="0" smtClean="0"/>
-              <a:t>In this presentation we are going to look </a:t>
-            </a:r>
-          </a:p>
-          <a:p>
-            <a:pPr marL="0" indent="0" fontAlgn="auto">
-              <a:spcAft>
-                <a:spcPts val="0"/>
-              </a:spcAft>
-              <a:buNone/>
-            </a:pPr>
-            <a:r>
-              <a:rPr lang="en-US" altLang="en-US" sz="1800" dirty="0" smtClean="0"/>
-              <a:t>at a Data Science point of view of how and why.  </a:t>
-            </a:r>
-          </a:p>
-          <a:p>
-            <a:pPr marL="0" indent="0" fontAlgn="auto">
-              <a:spcAft>
-                <a:spcPts val="0"/>
-              </a:spcAft>
-              <a:buNone/>
-            </a:pPr>
-            <a:endParaRPr lang="en-US" altLang="en-US" sz="1800" b="1" dirty="0" smtClean="0">
-              <a:solidFill>
-                <a:schemeClr val="accent6">
-                  <a:lumMod val="50000"/>
-                </a:schemeClr>
-              </a:solidFill>
-            </a:endParaRPr>
           </a:p>
           <a:p>
             <a:pPr marL="0" indent="0" fontAlgn="auto">
@@ -6129,25 +5793,79 @@
               </a:solidFill>
             </a:endParaRPr>
           </a:p>
+          <a:p>
+            <a:pPr marL="0" indent="0" fontAlgn="auto">
+              <a:spcAft>
+                <a:spcPts val="0"/>
+              </a:spcAft>
+              <a:buNone/>
+            </a:pPr>
+            <a:r>
+              <a:rPr lang="en-US" altLang="en-US" sz="1800" dirty="0"/>
+              <a:t>In this presentation we are going to look </a:t>
+            </a:r>
+          </a:p>
+          <a:p>
+            <a:pPr marL="0" indent="0" fontAlgn="auto">
+              <a:spcAft>
+                <a:spcPts val="0"/>
+              </a:spcAft>
+              <a:buNone/>
+            </a:pPr>
+            <a:r>
+              <a:rPr lang="en-US" altLang="en-US" sz="1800" dirty="0"/>
+              <a:t>at a Data Science point of view of how and why.  </a:t>
+            </a:r>
+          </a:p>
+          <a:p>
+            <a:pPr marL="0" indent="0" fontAlgn="auto">
+              <a:spcAft>
+                <a:spcPts val="0"/>
+              </a:spcAft>
+              <a:buNone/>
+            </a:pPr>
+            <a:endParaRPr lang="en-US" altLang="en-US" sz="1800" b="1" dirty="0">
+              <a:solidFill>
+                <a:schemeClr val="accent6">
+                  <a:lumMod val="50000"/>
+                </a:schemeClr>
+              </a:solidFill>
+            </a:endParaRPr>
+          </a:p>
+          <a:p>
+            <a:pPr marL="0" indent="0" fontAlgn="auto">
+              <a:spcAft>
+                <a:spcPts val="0"/>
+              </a:spcAft>
+              <a:buNone/>
+            </a:pPr>
+            <a:endParaRPr lang="en-US" altLang="en-US" sz="1800" b="1" dirty="0">
+              <a:solidFill>
+                <a:schemeClr val="accent6">
+                  <a:lumMod val="50000"/>
+                </a:schemeClr>
+              </a:solidFill>
+            </a:endParaRPr>
+          </a:p>
         </p:txBody>
       </p:sp>
     </p:spTree>
     <p:extLst>
       <p:ext uri="{BB962C8B-B14F-4D97-AF65-F5344CB8AC3E}">
-        <p14:creationId xmlns="" xmlns:p14="http://schemas.microsoft.com/office/powerpoint/2010/main" val="461669259"/>
+        <p14:creationId xmlns:p14="http://schemas.microsoft.com/office/powerpoint/2010/main" val="461669259"/>
       </p:ext>
     </p:extLst>
   </p:cSld>
   <p:clrMapOvr>
     <a:masterClrMapping/>
   </p:clrMapOvr>
-  <mc:AlternateContent xmlns:mc="http://schemas.openxmlformats.org/markup-compatibility/2006">
-    <mc:Choice xmlns="" xmlns:p14="http://schemas.microsoft.com/office/powerpoint/2010/main" Requires="p14">
+  <mc:AlternateContent xmlns:mc="http://schemas.openxmlformats.org/markup-compatibility/2006" xmlns:p14="http://schemas.microsoft.com/office/powerpoint/2010/main">
+    <mc:Choice Requires="p14">
       <p:transition spd="med" p14:dur="700">
         <p:fade/>
       </p:transition>
     </mc:Choice>
-    <mc:Fallback>
+    <mc:Fallback xmlns="">
       <p:transition spd="med">
         <p:fade/>
       </p:transition>
@@ -6216,7 +5934,7 @@
           <p:cNvPr id="6" name="Title 3">
             <a:extLst>
               <a:ext uri="{FF2B5EF4-FFF2-40B4-BE49-F238E27FC236}">
-                <a16:creationId xmlns="" xmlns:a16="http://schemas.microsoft.com/office/drawing/2014/main" id="{048FBE6B-DC67-4E64-80F4-CADE978D2FE3}"/>
+                <a16:creationId xmlns:a16="http://schemas.microsoft.com/office/drawing/2014/main" id="{048FBE6B-DC67-4E64-80F4-CADE978D2FE3}"/>
               </a:ext>
             </a:extLst>
           </p:cNvPr>
@@ -6259,7 +5977,7 @@
               <a:defRPr/>
             </a:pPr>
             <a:r>
-              <a:rPr kumimoji="0" lang="en-US" altLang="en-US" sz="4000" b="1" i="0" u="none" strike="noStrike" kern="1200" cap="none" spc="-50" normalizeH="0" baseline="0" noProof="0" dirty="0" smtClean="0">
+              <a:rPr kumimoji="0" lang="en-US" altLang="en-US" sz="4000" b="1" i="0" u="none" strike="noStrike" kern="1200" cap="none" spc="-50" normalizeH="0" baseline="0" noProof="0" dirty="0">
                 <a:ln w="3175">
                   <a:noFill/>
                 </a:ln>
@@ -6273,41 +5991,7 @@
                 <a:ea typeface="+mn-ea"/>
                 <a:cs typeface="Segoe UI" pitchFamily="34" charset="0"/>
               </a:rPr>
-              <a:t>COVID-19 </a:t>
-            </a:r>
-            <a:r>
-              <a:rPr kumimoji="0" lang="en-US" altLang="en-US" sz="4000" b="1" i="0" u="none" strike="noStrike" kern="1200" cap="none" spc="-50" normalizeH="0" baseline="0" noProof="0" dirty="0" smtClean="0">
-                <a:ln w="3175">
-                  <a:noFill/>
-                </a:ln>
-                <a:solidFill>
-                  <a:schemeClr val="tx1"/>
-                </a:solidFill>
-                <a:effectLst/>
-                <a:uLnTx/>
-                <a:uFillTx/>
-                <a:latin typeface="+mj-lt"/>
-                <a:ea typeface="+mn-ea"/>
-                <a:cs typeface="Segoe UI" pitchFamily="34" charset="0"/>
-              </a:rPr>
-              <a:t>Impact on Navajo </a:t>
-            </a:r>
-            <a:r>
-              <a:rPr kumimoji="0" lang="en-US" altLang="en-US" sz="4000" b="1" i="0" u="none" strike="noStrike" kern="1200" cap="none" spc="-50" normalizeH="0" baseline="0" noProof="0" dirty="0" smtClean="0">
-                <a:ln w="3175">
-                  <a:noFill/>
-                </a:ln>
-                <a:solidFill>
-                  <a:schemeClr val="tx1"/>
-                </a:solidFill>
-                <a:effectLst/>
-                <a:uLnTx/>
-                <a:uFillTx/>
-                <a:latin typeface="+mj-lt"/>
-                <a:ea typeface="+mn-ea"/>
-                <a:cs typeface="Segoe UI" pitchFamily="34" charset="0"/>
-              </a:rPr>
-              <a:t>Nation</a:t>
+              <a:t>COVID-19 Impact on Navajo Nation</a:t>
             </a:r>
             <a:endParaRPr kumimoji="0" lang="en-US" sz="4000" b="1" i="0" u="none" strike="noStrike" kern="1200" cap="none" spc="-50" normalizeH="0" baseline="0" noProof="0" dirty="0">
               <a:ln w="3175">
@@ -6331,13 +6015,13 @@
   <p:clrMapOvr>
     <a:masterClrMapping/>
   </p:clrMapOvr>
-  <mc:AlternateContent xmlns:mc="http://schemas.openxmlformats.org/markup-compatibility/2006">
-    <mc:Choice xmlns="" xmlns:p14="http://schemas.microsoft.com/office/powerpoint/2010/main" Requires="p14">
+  <mc:AlternateContent xmlns:mc="http://schemas.openxmlformats.org/markup-compatibility/2006" xmlns:p14="http://schemas.microsoft.com/office/powerpoint/2010/main">
+    <mc:Choice Requires="p14">
       <p:transition spd="med" p14:dur="700">
         <p:fade/>
       </p:transition>
     </mc:Choice>
-    <mc:Fallback>
+    <mc:Fallback xmlns="">
       <p:transition spd="med">
         <p:fade/>
       </p:transition>
@@ -6368,7 +6052,7 @@
           <p:cNvPr id="4" name="Title 3">
             <a:extLst>
               <a:ext uri="{FF2B5EF4-FFF2-40B4-BE49-F238E27FC236}">
-                <a16:creationId xmlns="" xmlns:a16="http://schemas.microsoft.com/office/drawing/2014/main" id="{FD9E38B3-4686-8247-9625-49018D29F408}"/>
+                <a16:creationId xmlns:a16="http://schemas.microsoft.com/office/drawing/2014/main" id="{FD9E38B3-4686-8247-9625-49018D29F408}"/>
               </a:ext>
             </a:extLst>
           </p:cNvPr>
@@ -6406,7 +6090,7 @@
           <p:cNvPr id="3" name="Text Placeholder 2">
             <a:extLst>
               <a:ext uri="{FF2B5EF4-FFF2-40B4-BE49-F238E27FC236}">
-                <a16:creationId xmlns="" xmlns:a16="http://schemas.microsoft.com/office/drawing/2014/main" id="{17155E1D-F4AD-41A7-B948-E2D246CCFE8A}"/>
+                <a16:creationId xmlns:a16="http://schemas.microsoft.com/office/drawing/2014/main" id="{17155E1D-F4AD-41A7-B948-E2D246CCFE8A}"/>
               </a:ext>
             </a:extLst>
           </p:cNvPr>
@@ -6431,7 +6115,7 @@
           <p:cNvPr id="5" name="Title 3">
             <a:extLst>
               <a:ext uri="{FF2B5EF4-FFF2-40B4-BE49-F238E27FC236}">
-                <a16:creationId xmlns="" xmlns:a16="http://schemas.microsoft.com/office/drawing/2014/main" id="{048FBE6B-DC67-4E64-80F4-CADE978D2FE3}"/>
+                <a16:creationId xmlns:a16="http://schemas.microsoft.com/office/drawing/2014/main" id="{048FBE6B-DC67-4E64-80F4-CADE978D2FE3}"/>
               </a:ext>
             </a:extLst>
           </p:cNvPr>
@@ -6474,7 +6158,7 @@
               <a:defRPr/>
             </a:pPr>
             <a:r>
-              <a:rPr kumimoji="0" lang="en-US" altLang="en-US" sz="4000" b="1" i="0" u="none" strike="noStrike" kern="1200" cap="none" spc="-50" normalizeH="0" baseline="0" noProof="0" dirty="0" smtClean="0">
+              <a:rPr kumimoji="0" lang="en-US" altLang="en-US" sz="4000" b="1" i="0" u="none" strike="noStrike" kern="1200" cap="none" spc="-50" normalizeH="0" baseline="0" noProof="0" dirty="0">
                 <a:ln w="3175">
                   <a:noFill/>
                 </a:ln>
@@ -6488,41 +6172,7 @@
                 <a:ea typeface="+mn-ea"/>
                 <a:cs typeface="Segoe UI" pitchFamily="34" charset="0"/>
               </a:rPr>
-              <a:t>COVID-19 </a:t>
-            </a:r>
-            <a:r>
-              <a:rPr kumimoji="0" lang="en-US" altLang="en-US" sz="4000" b="1" i="0" u="none" strike="noStrike" kern="1200" cap="none" spc="-50" normalizeH="0" baseline="0" noProof="0" dirty="0" smtClean="0">
-                <a:ln w="3175">
-                  <a:noFill/>
-                </a:ln>
-                <a:solidFill>
-                  <a:schemeClr val="tx1"/>
-                </a:solidFill>
-                <a:effectLst/>
-                <a:uLnTx/>
-                <a:uFillTx/>
-                <a:latin typeface="+mj-lt"/>
-                <a:ea typeface="+mn-ea"/>
-                <a:cs typeface="Segoe UI" pitchFamily="34" charset="0"/>
-              </a:rPr>
-              <a:t>Impact on Navajo </a:t>
-            </a:r>
-            <a:r>
-              <a:rPr kumimoji="0" lang="en-US" altLang="en-US" sz="4000" b="1" i="0" u="none" strike="noStrike" kern="1200" cap="none" spc="-50" normalizeH="0" baseline="0" noProof="0" dirty="0" smtClean="0">
-                <a:ln w="3175">
-                  <a:noFill/>
-                </a:ln>
-                <a:solidFill>
-                  <a:schemeClr val="tx1"/>
-                </a:solidFill>
-                <a:effectLst/>
-                <a:uLnTx/>
-                <a:uFillTx/>
-                <a:latin typeface="+mj-lt"/>
-                <a:ea typeface="+mn-ea"/>
-                <a:cs typeface="Segoe UI" pitchFamily="34" charset="0"/>
-              </a:rPr>
-              <a:t>Nation</a:t>
+              <a:t>COVID-19 Impact on Navajo Nation</a:t>
             </a:r>
             <a:endParaRPr kumimoji="0" lang="en-US" sz="4000" b="1" i="0" u="none" strike="noStrike" kern="1200" cap="none" spc="-50" normalizeH="0" baseline="0" noProof="0" dirty="0">
               <a:ln w="3175">
@@ -6544,20 +6194,20 @@
     </p:spTree>
     <p:extLst>
       <p:ext uri="{BB962C8B-B14F-4D97-AF65-F5344CB8AC3E}">
-        <p14:creationId xmlns="" xmlns:p14="http://schemas.microsoft.com/office/powerpoint/2010/main" val="4244761525"/>
+        <p14:creationId xmlns:p14="http://schemas.microsoft.com/office/powerpoint/2010/main" val="4244761525"/>
       </p:ext>
     </p:extLst>
   </p:cSld>
   <p:clrMapOvr>
     <a:masterClrMapping/>
   </p:clrMapOvr>
-  <mc:AlternateContent xmlns:mc="http://schemas.openxmlformats.org/markup-compatibility/2006">
-    <mc:Choice xmlns="" xmlns:p14="http://schemas.microsoft.com/office/powerpoint/2010/main" Requires="p14">
+  <mc:AlternateContent xmlns:mc="http://schemas.openxmlformats.org/markup-compatibility/2006" xmlns:p14="http://schemas.microsoft.com/office/powerpoint/2010/main">
+    <mc:Choice Requires="p14">
       <p:transition spd="med" p14:dur="700">
         <p:fade/>
       </p:transition>
     </mc:Choice>
-    <mc:Fallback>
+    <mc:Fallback xmlns="">
       <p:transition spd="med">
         <p:fade/>
       </p:transition>
@@ -6588,7 +6238,7 @@
           <p:cNvPr id="8" name="Title 3">
             <a:extLst>
               <a:ext uri="{FF2B5EF4-FFF2-40B4-BE49-F238E27FC236}">
-                <a16:creationId xmlns="" xmlns:a16="http://schemas.microsoft.com/office/drawing/2014/main" id="{068DF32A-D165-40DA-AAE8-A6E9579E2F79}"/>
+                <a16:creationId xmlns:a16="http://schemas.microsoft.com/office/drawing/2014/main" id="{068DF32A-D165-40DA-AAE8-A6E9579E2F79}"/>
               </a:ext>
             </a:extLst>
           </p:cNvPr>
@@ -6621,7 +6271,7 @@
           <p:cNvPr id="10" name="Title 3">
             <a:extLst>
               <a:ext uri="{FF2B5EF4-FFF2-40B4-BE49-F238E27FC236}">
-                <a16:creationId xmlns="" xmlns:a16="http://schemas.microsoft.com/office/drawing/2014/main" id="{048FBE6B-DC67-4E64-80F4-CADE978D2FE3}"/>
+                <a16:creationId xmlns:a16="http://schemas.microsoft.com/office/drawing/2014/main" id="{048FBE6B-DC67-4E64-80F4-CADE978D2FE3}"/>
               </a:ext>
             </a:extLst>
           </p:cNvPr>
@@ -6664,7 +6314,7 @@
               <a:defRPr/>
             </a:pPr>
             <a:r>
-              <a:rPr kumimoji="0" lang="en-US" altLang="en-US" sz="4000" b="1" i="0" u="none" strike="noStrike" kern="1200" cap="none" spc="-50" normalizeH="0" baseline="0" noProof="0" dirty="0" smtClean="0">
+              <a:rPr kumimoji="0" lang="en-US" altLang="en-US" sz="4000" b="1" i="0" u="none" strike="noStrike" kern="1200" cap="none" spc="-50" normalizeH="0" baseline="0" noProof="0" dirty="0">
                 <a:ln w="3175">
                   <a:noFill/>
                 </a:ln>
@@ -6678,41 +6328,7 @@
                 <a:ea typeface="+mn-ea"/>
                 <a:cs typeface="Segoe UI" pitchFamily="34" charset="0"/>
               </a:rPr>
-              <a:t>COVID-19 </a:t>
-            </a:r>
-            <a:r>
-              <a:rPr kumimoji="0" lang="en-US" altLang="en-US" sz="4000" b="1" i="0" u="none" strike="noStrike" kern="1200" cap="none" spc="-50" normalizeH="0" baseline="0" noProof="0" dirty="0" smtClean="0">
-                <a:ln w="3175">
-                  <a:noFill/>
-                </a:ln>
-                <a:solidFill>
-                  <a:schemeClr val="accent2"/>
-                </a:solidFill>
-                <a:effectLst/>
-                <a:uLnTx/>
-                <a:uFillTx/>
-                <a:latin typeface="+mj-lt"/>
-                <a:ea typeface="+mn-ea"/>
-                <a:cs typeface="Segoe UI" pitchFamily="34" charset="0"/>
-              </a:rPr>
-              <a:t>Impact on Navajo </a:t>
-            </a:r>
-            <a:r>
-              <a:rPr kumimoji="0" lang="en-US" altLang="en-US" sz="4000" b="1" i="0" u="none" strike="noStrike" kern="1200" cap="none" spc="-50" normalizeH="0" baseline="0" noProof="0" dirty="0" smtClean="0">
-                <a:ln w="3175">
-                  <a:noFill/>
-                </a:ln>
-                <a:solidFill>
-                  <a:schemeClr val="accent2"/>
-                </a:solidFill>
-                <a:effectLst/>
-                <a:uLnTx/>
-                <a:uFillTx/>
-                <a:latin typeface="+mj-lt"/>
-                <a:ea typeface="+mn-ea"/>
-                <a:cs typeface="Segoe UI" pitchFamily="34" charset="0"/>
-              </a:rPr>
-              <a:t>Nation</a:t>
+              <a:t>COVID-19 Impact on Navajo Nation</a:t>
             </a:r>
             <a:endParaRPr kumimoji="0" lang="en-US" sz="4000" b="1" i="0" u="none" strike="noStrike" kern="1200" cap="none" spc="-50" normalizeH="0" baseline="0" noProof="0" dirty="0">
               <a:ln w="3175">
@@ -6761,7 +6377,7 @@
           <p:cNvPr id="16" name="Text Placeholder 15">
             <a:extLst>
               <a:ext uri="{FF2B5EF4-FFF2-40B4-BE49-F238E27FC236}">
-                <a16:creationId xmlns="" xmlns:a16="http://schemas.microsoft.com/office/drawing/2014/main" id="{82B839A9-BE4F-40C7-ABA3-682B626FFB08}"/>
+                <a16:creationId xmlns:a16="http://schemas.microsoft.com/office/drawing/2014/main" id="{82B839A9-BE4F-40C7-ABA3-682B626FFB08}"/>
               </a:ext>
             </a:extLst>
           </p:cNvPr>
@@ -6784,10 +6400,9 @@
           <a:p>
             <a:pPr algn="ctr"/>
             <a:r>
-              <a:rPr lang="en-US" sz="4000" dirty="0" smtClean="0"/>
+              <a:rPr lang="en-US" sz="4000" dirty="0"/>
               <a:t>The Presenters</a:t>
             </a:r>
-            <a:endParaRPr lang="en-US" sz="4000" dirty="0"/>
           </a:p>
         </p:txBody>
       </p:sp>
@@ -6796,7 +6411,7 @@
           <p:cNvPr id="5" name="Freeform: Shape 4">
             <a:extLst>
               <a:ext uri="{FF2B5EF4-FFF2-40B4-BE49-F238E27FC236}">
-                <a16:creationId xmlns="" xmlns:a16="http://schemas.microsoft.com/office/drawing/2014/main" id="{69764EBF-31FA-492E-8998-3077A3B6462E}"/>
+                <a16:creationId xmlns:a16="http://schemas.microsoft.com/office/drawing/2014/main" id="{69764EBF-31FA-492E-8998-3077A3B6462E}"/>
               </a:ext>
             </a:extLst>
           </p:cNvPr>
@@ -6919,7 +6534,7 @@
               <a:buNone/>
             </a:pPr>
             <a:r>
-              <a:rPr lang="en-US" altLang="en-US" sz="2000" b="1" kern="1200" dirty="0" smtClean="0">
+              <a:rPr lang="en-US" altLang="en-US" sz="2000" b="1" kern="1200" dirty="0">
                 <a:solidFill>
                   <a:schemeClr val="accent6">
                     <a:lumMod val="50000"/>
@@ -6944,7 +6559,7 @@
           <p:cNvPr id="8" name="Freeform: Shape 7">
             <a:extLst>
               <a:ext uri="{FF2B5EF4-FFF2-40B4-BE49-F238E27FC236}">
-                <a16:creationId xmlns="" xmlns:a16="http://schemas.microsoft.com/office/drawing/2014/main" id="{7D11453A-1865-4EAB-B7E0-024FA352854C}"/>
+                <a16:creationId xmlns:a16="http://schemas.microsoft.com/office/drawing/2014/main" id="{7D11453A-1865-4EAB-B7E0-024FA352854C}"/>
               </a:ext>
             </a:extLst>
           </p:cNvPr>
@@ -7067,7 +6682,7 @@
               <a:buNone/>
             </a:pPr>
             <a:r>
-              <a:rPr lang="en-US" altLang="en-US" sz="2000" b="1" kern="1200" dirty="0" smtClean="0">
+              <a:rPr lang="en-US" altLang="en-US" sz="2000" b="1" kern="1200" dirty="0">
                 <a:solidFill>
                   <a:schemeClr val="accent6">
                     <a:lumMod val="50000"/>
@@ -7078,7 +6693,7 @@
               <a:t>Craig </a:t>
             </a:r>
             <a:r>
-              <a:rPr lang="en-US" altLang="en-US" sz="2000" b="1" kern="1200" dirty="0" err="1" smtClean="0">
+              <a:rPr lang="en-US" altLang="en-US" sz="2000" b="1" kern="1200" dirty="0" err="1">
                 <a:solidFill>
                   <a:schemeClr val="accent6">
                     <a:lumMod val="50000"/>
@@ -7103,7 +6718,7 @@
           <p:cNvPr id="10" name="Freeform: Shape 9">
             <a:extLst>
               <a:ext uri="{FF2B5EF4-FFF2-40B4-BE49-F238E27FC236}">
-                <a16:creationId xmlns="" xmlns:a16="http://schemas.microsoft.com/office/drawing/2014/main" id="{2C5EA7BE-5E78-4EA8-9C6D-F00C129B0C70}"/>
+                <a16:creationId xmlns:a16="http://schemas.microsoft.com/office/drawing/2014/main" id="{2C5EA7BE-5E78-4EA8-9C6D-F00C129B0C70}"/>
               </a:ext>
             </a:extLst>
           </p:cNvPr>
@@ -7226,7 +6841,7 @@
               <a:buNone/>
             </a:pPr>
             <a:r>
-              <a:rPr lang="en-US" altLang="en-US" sz="2000" b="1" kern="1200" dirty="0" smtClean="0">
+              <a:rPr lang="en-US" altLang="en-US" sz="2000" b="1" kern="1200" dirty="0">
                 <a:solidFill>
                   <a:schemeClr val="accent6">
                     <a:lumMod val="50000"/>
@@ -7251,7 +6866,7 @@
           <p:cNvPr id="14" name="Title 3">
             <a:extLst>
               <a:ext uri="{FF2B5EF4-FFF2-40B4-BE49-F238E27FC236}">
-                <a16:creationId xmlns="" xmlns:a16="http://schemas.microsoft.com/office/drawing/2014/main" id="{048FBE6B-DC67-4E64-80F4-CADE978D2FE3}"/>
+                <a16:creationId xmlns:a16="http://schemas.microsoft.com/office/drawing/2014/main" id="{048FBE6B-DC67-4E64-80F4-CADE978D2FE3}"/>
               </a:ext>
             </a:extLst>
           </p:cNvPr>
@@ -7294,7 +6909,7 @@
               <a:defRPr/>
             </a:pPr>
             <a:r>
-              <a:rPr kumimoji="0" lang="en-US" altLang="en-US" sz="4000" b="1" i="0" u="none" strike="noStrike" kern="1200" cap="none" spc="-50" normalizeH="0" baseline="0" noProof="0" dirty="0" smtClean="0">
+              <a:rPr kumimoji="0" lang="en-US" altLang="en-US" sz="4000" b="1" i="0" u="none" strike="noStrike" kern="1200" cap="none" spc="-50" normalizeH="0" baseline="0" noProof="0" dirty="0">
                 <a:ln w="3175">
                   <a:noFill/>
                 </a:ln>
@@ -7308,41 +6923,7 @@
                 <a:ea typeface="+mn-ea"/>
                 <a:cs typeface="Segoe UI" pitchFamily="34" charset="0"/>
               </a:rPr>
-              <a:t>COVID-19 </a:t>
-            </a:r>
-            <a:r>
-              <a:rPr kumimoji="0" lang="en-US" altLang="en-US" sz="4000" b="1" i="0" u="none" strike="noStrike" kern="1200" cap="none" spc="-50" normalizeH="0" baseline="0" noProof="0" dirty="0" smtClean="0">
-                <a:ln w="3175">
-                  <a:noFill/>
-                </a:ln>
-                <a:solidFill>
-                  <a:schemeClr val="accent2"/>
-                </a:solidFill>
-                <a:effectLst/>
-                <a:uLnTx/>
-                <a:uFillTx/>
-                <a:latin typeface="+mj-lt"/>
-                <a:ea typeface="+mn-ea"/>
-                <a:cs typeface="Segoe UI" pitchFamily="34" charset="0"/>
-              </a:rPr>
-              <a:t>Impact on </a:t>
-            </a:r>
-            <a:r>
-              <a:rPr kumimoji="0" lang="en-US" altLang="en-US" sz="4000" b="1" i="0" u="none" strike="noStrike" kern="1200" cap="none" spc="-50" normalizeH="0" baseline="0" noProof="0" dirty="0" smtClean="0">
-                <a:ln w="3175">
-                  <a:noFill/>
-                </a:ln>
-                <a:solidFill>
-                  <a:schemeClr val="accent2"/>
-                </a:solidFill>
-                <a:effectLst/>
-                <a:uLnTx/>
-                <a:uFillTx/>
-                <a:latin typeface="+mj-lt"/>
-                <a:ea typeface="+mn-ea"/>
-                <a:cs typeface="Segoe UI" pitchFamily="34" charset="0"/>
-              </a:rPr>
-              <a:t>Navajo Nation</a:t>
+              <a:t>COVID-19 Impact on Navajo Nation</a:t>
             </a:r>
             <a:endParaRPr kumimoji="0" lang="en-US" sz="4000" b="1" i="0" u="none" strike="noStrike" kern="1200" cap="none" spc="-50" normalizeH="0" baseline="0" noProof="0" dirty="0">
               <a:ln w="3175">
@@ -7448,20 +7029,20 @@
     </p:spTree>
     <p:extLst>
       <p:ext uri="{BB962C8B-B14F-4D97-AF65-F5344CB8AC3E}">
-        <p14:creationId xmlns="" xmlns:p14="http://schemas.microsoft.com/office/powerpoint/2010/main" val="4143959621"/>
+        <p14:creationId xmlns:p14="http://schemas.microsoft.com/office/powerpoint/2010/main" val="4143959621"/>
       </p:ext>
     </p:extLst>
   </p:cSld>
   <p:clrMapOvr>
     <a:masterClrMapping/>
   </p:clrMapOvr>
-  <mc:AlternateContent xmlns:mc="http://schemas.openxmlformats.org/markup-compatibility/2006">
-    <mc:Choice xmlns="" xmlns:p14="http://schemas.microsoft.com/office/powerpoint/2010/main" Requires="p14">
+  <mc:AlternateContent xmlns:mc="http://schemas.openxmlformats.org/markup-compatibility/2006" xmlns:p14="http://schemas.microsoft.com/office/powerpoint/2010/main">
+    <mc:Choice Requires="p14">
       <p:transition spd="med" p14:dur="700">
         <p:fade/>
       </p:transition>
     </mc:Choice>
-    <mc:Fallback>
+    <mc:Fallback xmlns="">
       <p:transition spd="med">
         <p:fade/>
       </p:transition>
@@ -7492,7 +7073,7 @@
           <p:cNvPr id="4" name="Title 3">
             <a:extLst>
               <a:ext uri="{FF2B5EF4-FFF2-40B4-BE49-F238E27FC236}">
-                <a16:creationId xmlns="" xmlns:a16="http://schemas.microsoft.com/office/drawing/2014/main" id="{FD9E38B3-4686-8247-9625-49018D29F408}"/>
+                <a16:creationId xmlns:a16="http://schemas.microsoft.com/office/drawing/2014/main" id="{FD9E38B3-4686-8247-9625-49018D29F408}"/>
               </a:ext>
             </a:extLst>
           </p:cNvPr>
@@ -7515,7 +7096,7 @@
           <a:p>
             <a:pPr algn="ctr"/>
             <a:r>
-              <a:rPr lang="en-US" dirty="0" smtClean="0"/>
+              <a:rPr lang="en-US" dirty="0"/>
               <a:t>Bio: Richard Brown</a:t>
             </a:r>
             <a:endParaRPr lang="en-US" sz="4000" b="1" dirty="0">
@@ -7531,7 +7112,7 @@
           <p:cNvPr id="6" name="Text Placeholder 5">
             <a:extLst>
               <a:ext uri="{FF2B5EF4-FFF2-40B4-BE49-F238E27FC236}">
-                <a16:creationId xmlns="" xmlns:a16="http://schemas.microsoft.com/office/drawing/2014/main" id="{7DCBA01B-ECA4-4938-872A-B38BEB13AC06}"/>
+                <a16:creationId xmlns:a16="http://schemas.microsoft.com/office/drawing/2014/main" id="{7DCBA01B-ECA4-4938-872A-B38BEB13AC06}"/>
               </a:ext>
             </a:extLst>
           </p:cNvPr>
@@ -7547,7 +7128,42 @@
           <a:bodyPr/>
           <a:lstStyle/>
           <a:p>
-            <a:endParaRPr lang="en-US" dirty="0"/>
+            <a:pPr marL="285750" indent="-285750">
+              <a:buFont typeface="Arial" panose="020B0604020202020204" pitchFamily="34" charset="0"/>
+              <a:buChar char="•"/>
+            </a:pPr>
+            <a:r>
+              <a:rPr lang="en-US" dirty="0"/>
+              <a:t>Richard to come to Woz- U following of 9 years of teaching middle and high school science. </a:t>
+            </a:r>
+          </a:p>
+          <a:p>
+            <a:pPr marL="285750" indent="-285750">
+              <a:buFont typeface="Arial" panose="020B0604020202020204" pitchFamily="34" charset="0"/>
+              <a:buChar char="•"/>
+            </a:pPr>
+            <a:r>
+              <a:rPr lang="en-US" dirty="0"/>
+              <a:t>7 years of teaching on the Navajo (Diné</a:t>
+            </a:r>
+            <a:r>
+              <a:rPr lang="en-US" i="1" dirty="0"/>
+              <a:t>)</a:t>
+            </a:r>
+            <a:r>
+              <a:rPr lang="en-US" dirty="0"/>
+              <a:t> Nation teaching middle and high school Earth Science and head wrestling coach for both high school and middle schools </a:t>
+            </a:r>
+          </a:p>
+          <a:p>
+            <a:pPr marL="285750" indent="-285750">
+              <a:buFont typeface="Arial" panose="020B0604020202020204" pitchFamily="34" charset="0"/>
+              <a:buChar char="•"/>
+            </a:pPr>
+            <a:r>
+              <a:rPr lang="en-US" dirty="0"/>
+              <a:t>Lived on the Navajo (Dine) Nation, in Window Rock (Navajo Nation Capital) and lived in Sanders, Arizona. </a:t>
+            </a:r>
           </a:p>
         </p:txBody>
       </p:sp>
@@ -7556,7 +7172,7 @@
           <p:cNvPr id="5" name="Title 3">
             <a:extLst>
               <a:ext uri="{FF2B5EF4-FFF2-40B4-BE49-F238E27FC236}">
-                <a16:creationId xmlns="" xmlns:a16="http://schemas.microsoft.com/office/drawing/2014/main" id="{048FBE6B-DC67-4E64-80F4-CADE978D2FE3}"/>
+                <a16:creationId xmlns:a16="http://schemas.microsoft.com/office/drawing/2014/main" id="{048FBE6B-DC67-4E64-80F4-CADE978D2FE3}"/>
               </a:ext>
             </a:extLst>
           </p:cNvPr>
@@ -7599,7 +7215,7 @@
               <a:defRPr/>
             </a:pPr>
             <a:r>
-              <a:rPr kumimoji="0" lang="en-US" altLang="en-US" sz="4000" b="1" i="0" u="none" strike="noStrike" kern="1200" cap="none" spc="-50" normalizeH="0" baseline="0" noProof="0" dirty="0" smtClean="0">
+              <a:rPr kumimoji="0" lang="en-US" altLang="en-US" sz="4000" b="1" i="0" u="none" strike="noStrike" kern="1200" cap="none" spc="-50" normalizeH="0" baseline="0" noProof="0" dirty="0">
                 <a:ln w="3175">
                   <a:noFill/>
                 </a:ln>
@@ -7613,24 +7229,7 @@
                 <a:ea typeface="+mn-ea"/>
                 <a:cs typeface="Segoe UI" pitchFamily="34" charset="0"/>
               </a:rPr>
-              <a:t>COVID-19 Impact on Navajo </a:t>
-            </a:r>
-            <a:r>
-              <a:rPr kumimoji="0" lang="en-US" altLang="en-US" sz="4000" b="1" i="0" u="none" strike="noStrike" kern="1200" cap="none" spc="-50" normalizeH="0" baseline="0" noProof="0" dirty="0" smtClean="0">
-                <a:ln w="3175">
-                  <a:noFill/>
-                </a:ln>
-                <a:solidFill>
-                  <a:schemeClr val="tx1"/>
-                </a:solidFill>
-                <a:effectLst/>
-                <a:uLnTx/>
-                <a:uFillTx/>
-                <a:latin typeface="+mj-lt"/>
-                <a:ea typeface="+mn-ea"/>
-                <a:cs typeface="Segoe UI" pitchFamily="34" charset="0"/>
-              </a:rPr>
-              <a:t>Nation</a:t>
+              <a:t>COVID-19 Impact on Navajo Nation</a:t>
             </a:r>
             <a:endParaRPr kumimoji="0" lang="en-US" sz="4000" b="1" i="0" u="none" strike="noStrike" kern="1200" cap="none" spc="-50" normalizeH="0" baseline="0" noProof="0" dirty="0">
               <a:ln w="3175">
@@ -7652,20 +7251,20 @@
     </p:spTree>
     <p:extLst>
       <p:ext uri="{BB962C8B-B14F-4D97-AF65-F5344CB8AC3E}">
-        <p14:creationId xmlns="" xmlns:p14="http://schemas.microsoft.com/office/powerpoint/2010/main" val="803542810"/>
+        <p14:creationId xmlns:p14="http://schemas.microsoft.com/office/powerpoint/2010/main" val="803542810"/>
       </p:ext>
     </p:extLst>
   </p:cSld>
   <p:clrMapOvr>
     <a:masterClrMapping/>
   </p:clrMapOvr>
-  <mc:AlternateContent xmlns:mc="http://schemas.openxmlformats.org/markup-compatibility/2006">
-    <mc:Choice xmlns="" xmlns:p14="http://schemas.microsoft.com/office/powerpoint/2010/main" Requires="p14">
+  <mc:AlternateContent xmlns:mc="http://schemas.openxmlformats.org/markup-compatibility/2006" xmlns:p14="http://schemas.microsoft.com/office/powerpoint/2010/main">
+    <mc:Choice Requires="p14">
       <p:transition spd="med" p14:dur="700">
         <p:fade/>
       </p:transition>
     </mc:Choice>
-    <mc:Fallback>
+    <mc:Fallback xmlns="">
       <p:transition spd="med">
         <p:fade/>
       </p:transition>
@@ -7696,7 +7295,7 @@
           <p:cNvPr id="4" name="Title 3">
             <a:extLst>
               <a:ext uri="{FF2B5EF4-FFF2-40B4-BE49-F238E27FC236}">
-                <a16:creationId xmlns="" xmlns:a16="http://schemas.microsoft.com/office/drawing/2014/main" id="{FD9E38B3-4686-8247-9625-49018D29F408}"/>
+                <a16:creationId xmlns:a16="http://schemas.microsoft.com/office/drawing/2014/main" id="{FD9E38B3-4686-8247-9625-49018D29F408}"/>
               </a:ext>
             </a:extLst>
           </p:cNvPr>
@@ -7719,11 +7318,11 @@
           <a:p>
             <a:pPr algn="ctr"/>
             <a:r>
-              <a:rPr lang="en-US" dirty="0" smtClean="0"/>
+              <a:rPr lang="en-US" dirty="0"/>
               <a:t>Bio: Craig </a:t>
             </a:r>
             <a:r>
-              <a:rPr lang="en-US" dirty="0" err="1" smtClean="0"/>
+              <a:rPr lang="en-US" dirty="0" err="1"/>
               <a:t>Costenbader</a:t>
             </a:r>
             <a:endParaRPr lang="en-US" sz="4000" b="1" dirty="0">
@@ -7739,7 +7338,7 @@
           <p:cNvPr id="6" name="Text Placeholder 5">
             <a:extLst>
               <a:ext uri="{FF2B5EF4-FFF2-40B4-BE49-F238E27FC236}">
-                <a16:creationId xmlns="" xmlns:a16="http://schemas.microsoft.com/office/drawing/2014/main" id="{7DCBA01B-ECA4-4938-872A-B38BEB13AC06}"/>
+                <a16:creationId xmlns:a16="http://schemas.microsoft.com/office/drawing/2014/main" id="{7DCBA01B-ECA4-4938-872A-B38BEB13AC06}"/>
               </a:ext>
             </a:extLst>
           </p:cNvPr>
@@ -7764,7 +7363,7 @@
           <p:cNvPr id="5" name="Title 3">
             <a:extLst>
               <a:ext uri="{FF2B5EF4-FFF2-40B4-BE49-F238E27FC236}">
-                <a16:creationId xmlns="" xmlns:a16="http://schemas.microsoft.com/office/drawing/2014/main" id="{048FBE6B-DC67-4E64-80F4-CADE978D2FE3}"/>
+                <a16:creationId xmlns:a16="http://schemas.microsoft.com/office/drawing/2014/main" id="{048FBE6B-DC67-4E64-80F4-CADE978D2FE3}"/>
               </a:ext>
             </a:extLst>
           </p:cNvPr>
@@ -7807,7 +7406,7 @@
               <a:defRPr/>
             </a:pPr>
             <a:r>
-              <a:rPr kumimoji="0" lang="en-US" altLang="en-US" sz="4000" b="1" i="0" u="none" strike="noStrike" kern="1200" cap="none" spc="-50" normalizeH="0" baseline="0" noProof="0" dirty="0" smtClean="0">
+              <a:rPr kumimoji="0" lang="en-US" altLang="en-US" sz="4000" b="1" i="0" u="none" strike="noStrike" kern="1200" cap="none" spc="-50" normalizeH="0" baseline="0" noProof="0" dirty="0">
                 <a:ln w="3175">
                   <a:noFill/>
                 </a:ln>
@@ -7821,24 +7420,7 @@
                 <a:ea typeface="+mn-ea"/>
                 <a:cs typeface="Segoe UI" pitchFamily="34" charset="0"/>
               </a:rPr>
-              <a:t>COVID-19 Impact on Navajo </a:t>
-            </a:r>
-            <a:r>
-              <a:rPr kumimoji="0" lang="en-US" altLang="en-US" sz="4000" b="1" i="0" u="none" strike="noStrike" kern="1200" cap="none" spc="-50" normalizeH="0" baseline="0" noProof="0" dirty="0" smtClean="0">
-                <a:ln w="3175">
-                  <a:noFill/>
-                </a:ln>
-                <a:solidFill>
-                  <a:schemeClr val="tx1"/>
-                </a:solidFill>
-                <a:effectLst/>
-                <a:uLnTx/>
-                <a:uFillTx/>
-                <a:latin typeface="+mj-lt"/>
-                <a:ea typeface="+mn-ea"/>
-                <a:cs typeface="Segoe UI" pitchFamily="34" charset="0"/>
-              </a:rPr>
-              <a:t>Nation</a:t>
+              <a:t>COVID-19 Impact on Navajo Nation</a:t>
             </a:r>
             <a:endParaRPr kumimoji="0" lang="en-US" sz="4000" b="1" i="0" u="none" strike="noStrike" kern="1200" cap="none" spc="-50" normalizeH="0" baseline="0" noProof="0" dirty="0">
               <a:ln w="3175">
@@ -7860,20 +7442,20 @@
     </p:spTree>
     <p:extLst>
       <p:ext uri="{BB962C8B-B14F-4D97-AF65-F5344CB8AC3E}">
-        <p14:creationId xmlns="" xmlns:p14="http://schemas.microsoft.com/office/powerpoint/2010/main" val="803542810"/>
+        <p14:creationId xmlns:p14="http://schemas.microsoft.com/office/powerpoint/2010/main" val="803542810"/>
       </p:ext>
     </p:extLst>
   </p:cSld>
   <p:clrMapOvr>
     <a:masterClrMapping/>
   </p:clrMapOvr>
-  <mc:AlternateContent xmlns:mc="http://schemas.openxmlformats.org/markup-compatibility/2006">
-    <mc:Choice xmlns="" xmlns:p14="http://schemas.microsoft.com/office/powerpoint/2010/main" Requires="p14">
+  <mc:AlternateContent xmlns:mc="http://schemas.openxmlformats.org/markup-compatibility/2006" xmlns:p14="http://schemas.microsoft.com/office/powerpoint/2010/main">
+    <mc:Choice Requires="p14">
       <p:transition spd="med" p14:dur="700">
         <p:fade/>
       </p:transition>
     </mc:Choice>
-    <mc:Fallback>
+    <mc:Fallback xmlns="">
       <p:transition spd="med">
         <p:fade/>
       </p:transition>
@@ -7904,7 +7486,7 @@
           <p:cNvPr id="4" name="Title 3">
             <a:extLst>
               <a:ext uri="{FF2B5EF4-FFF2-40B4-BE49-F238E27FC236}">
-                <a16:creationId xmlns="" xmlns:a16="http://schemas.microsoft.com/office/drawing/2014/main" id="{FD9E38B3-4686-8247-9625-49018D29F408}"/>
+                <a16:creationId xmlns:a16="http://schemas.microsoft.com/office/drawing/2014/main" id="{FD9E38B3-4686-8247-9625-49018D29F408}"/>
               </a:ext>
             </a:extLst>
           </p:cNvPr>
@@ -7927,7 +7509,7 @@
           <a:p>
             <a:pPr algn="ctr"/>
             <a:r>
-              <a:rPr lang="en-US" dirty="0" smtClean="0"/>
+              <a:rPr lang="en-US" dirty="0"/>
               <a:t>Bio: Matt McMahon</a:t>
             </a:r>
             <a:endParaRPr lang="en-US" sz="4000" b="1" dirty="0">
@@ -7943,7 +7525,7 @@
           <p:cNvPr id="6" name="Text Placeholder 5">
             <a:extLst>
               <a:ext uri="{FF2B5EF4-FFF2-40B4-BE49-F238E27FC236}">
-                <a16:creationId xmlns="" xmlns:a16="http://schemas.microsoft.com/office/drawing/2014/main" id="{7DCBA01B-ECA4-4938-872A-B38BEB13AC06}"/>
+                <a16:creationId xmlns:a16="http://schemas.microsoft.com/office/drawing/2014/main" id="{7DCBA01B-ECA4-4938-872A-B38BEB13AC06}"/>
               </a:ext>
             </a:extLst>
           </p:cNvPr>
@@ -7965,31 +7547,31 @@
           <a:lstStyle/>
           <a:p>
             <a:r>
-              <a:rPr lang="en-US" dirty="0" smtClean="0"/>
+              <a:rPr lang="en-US" dirty="0"/>
               <a:t>Matt comes to </a:t>
             </a:r>
             <a:r>
-              <a:rPr lang="en-US" dirty="0" err="1" smtClean="0"/>
+              <a:rPr lang="en-US" dirty="0" err="1"/>
               <a:t>Woz</a:t>
             </a:r>
             <a:r>
-              <a:rPr lang="en-US" dirty="0" smtClean="0"/>
+              <a:rPr lang="en-US" dirty="0"/>
               <a:t>-U following six years working as a salesperson for The Men’s </a:t>
             </a:r>
             <a:r>
-              <a:rPr lang="en-US" dirty="0" err="1" smtClean="0"/>
+              <a:rPr lang="en-US" dirty="0" err="1"/>
               <a:t>Wearhouse</a:t>
             </a:r>
             <a:r>
-              <a:rPr lang="en-US" dirty="0" smtClean="0"/>
+              <a:rPr lang="en-US" dirty="0"/>
               <a:t> in Manhattan.  He currently resides in the Lower Hudson Valley.  Following the fallout from the COVID-19 pandemic Matt decided to join the data science program at </a:t>
             </a:r>
             <a:r>
-              <a:rPr lang="en-US" dirty="0" err="1" smtClean="0"/>
+              <a:rPr lang="en-US" dirty="0" err="1"/>
               <a:t>Woz</a:t>
             </a:r>
             <a:r>
-              <a:rPr lang="en-US" dirty="0" smtClean="0"/>
+              <a:rPr lang="en-US" dirty="0"/>
               <a:t>-U.  What interested him about the data science program is its application to many fields with promise of continued growth and learning in any career path.  Matt took interest in this topic because of it dealing with real world issues and his interest in advocacy for disenfranchised or marginalized groups – especially now as our focus seems to be continually on how to better organize ourselves to help communities in need.  </a:t>
             </a:r>
           </a:p>
@@ -8003,7 +7585,7 @@
           <p:cNvPr id="5" name="Title 3">
             <a:extLst>
               <a:ext uri="{FF2B5EF4-FFF2-40B4-BE49-F238E27FC236}">
-                <a16:creationId xmlns="" xmlns:a16="http://schemas.microsoft.com/office/drawing/2014/main" id="{048FBE6B-DC67-4E64-80F4-CADE978D2FE3}"/>
+                <a16:creationId xmlns:a16="http://schemas.microsoft.com/office/drawing/2014/main" id="{048FBE6B-DC67-4E64-80F4-CADE978D2FE3}"/>
               </a:ext>
             </a:extLst>
           </p:cNvPr>
@@ -8046,7 +7628,7 @@
               <a:defRPr/>
             </a:pPr>
             <a:r>
-              <a:rPr kumimoji="0" lang="en-US" altLang="en-US" sz="4000" b="1" i="0" u="none" strike="noStrike" kern="1200" cap="none" spc="-50" normalizeH="0" baseline="0" noProof="0" dirty="0" smtClean="0">
+              <a:rPr kumimoji="0" lang="en-US" altLang="en-US" sz="4000" b="1" i="0" u="none" strike="noStrike" kern="1200" cap="none" spc="-50" normalizeH="0" baseline="0" noProof="0" dirty="0">
                 <a:ln w="3175">
                   <a:noFill/>
                 </a:ln>
@@ -8060,24 +7642,7 @@
                 <a:ea typeface="+mn-ea"/>
                 <a:cs typeface="Segoe UI" pitchFamily="34" charset="0"/>
               </a:rPr>
-              <a:t>COVID-19 Impact on Navajo </a:t>
-            </a:r>
-            <a:r>
-              <a:rPr kumimoji="0" lang="en-US" altLang="en-US" sz="4000" b="1" i="0" u="none" strike="noStrike" kern="1200" cap="none" spc="-50" normalizeH="0" baseline="0" noProof="0" dirty="0" smtClean="0">
-                <a:ln w="3175">
-                  <a:noFill/>
-                </a:ln>
-                <a:solidFill>
-                  <a:schemeClr val="tx1"/>
-                </a:solidFill>
-                <a:effectLst/>
-                <a:uLnTx/>
-                <a:uFillTx/>
-                <a:latin typeface="+mj-lt"/>
-                <a:ea typeface="+mn-ea"/>
-                <a:cs typeface="Segoe UI" pitchFamily="34" charset="0"/>
-              </a:rPr>
-              <a:t>Nation</a:t>
+              <a:t>COVID-19 Impact on Navajo Nation</a:t>
             </a:r>
             <a:endParaRPr kumimoji="0" lang="en-US" sz="4000" b="1" i="0" u="none" strike="noStrike" kern="1200" cap="none" spc="-50" normalizeH="0" baseline="0" noProof="0" dirty="0">
               <a:ln w="3175">
@@ -8099,20 +7664,20 @@
     </p:spTree>
     <p:extLst>
       <p:ext uri="{BB962C8B-B14F-4D97-AF65-F5344CB8AC3E}">
-        <p14:creationId xmlns="" xmlns:p14="http://schemas.microsoft.com/office/powerpoint/2010/main" val="803542810"/>
+        <p14:creationId xmlns:p14="http://schemas.microsoft.com/office/powerpoint/2010/main" val="803542810"/>
       </p:ext>
     </p:extLst>
   </p:cSld>
   <p:clrMapOvr>
     <a:masterClrMapping/>
   </p:clrMapOvr>
-  <mc:AlternateContent xmlns:mc="http://schemas.openxmlformats.org/markup-compatibility/2006">
-    <mc:Choice xmlns="" xmlns:p14="http://schemas.microsoft.com/office/powerpoint/2010/main" Requires="p14">
+  <mc:AlternateContent xmlns:mc="http://schemas.openxmlformats.org/markup-compatibility/2006" xmlns:p14="http://schemas.microsoft.com/office/powerpoint/2010/main">
+    <mc:Choice Requires="p14">
       <p:transition spd="med" p14:dur="700">
         <p:fade/>
       </p:transition>
     </mc:Choice>
-    <mc:Fallback>
+    <mc:Fallback xmlns="">
       <p:transition spd="med">
         <p:fade/>
       </p:transition>
@@ -8151,7 +7716,7 @@
           <p:cNvPr id="4" name="Title 3">
             <a:extLst>
               <a:ext uri="{FF2B5EF4-FFF2-40B4-BE49-F238E27FC236}">
-                <a16:creationId xmlns="" xmlns:a16="http://schemas.microsoft.com/office/drawing/2014/main" id="{FD9E38B3-4686-8247-9625-49018D29F408}"/>
+                <a16:creationId xmlns:a16="http://schemas.microsoft.com/office/drawing/2014/main" id="{FD9E38B3-4686-8247-9625-49018D29F408}"/>
               </a:ext>
             </a:extLst>
           </p:cNvPr>
@@ -8186,7 +7751,7 @@
           <p:cNvPr id="3" name="Text Placeholder 2">
             <a:extLst>
               <a:ext uri="{FF2B5EF4-FFF2-40B4-BE49-F238E27FC236}">
-                <a16:creationId xmlns="" xmlns:a16="http://schemas.microsoft.com/office/drawing/2014/main" id="{17155E1D-F4AD-41A7-B948-E2D246CCFE8A}"/>
+                <a16:creationId xmlns:a16="http://schemas.microsoft.com/office/drawing/2014/main" id="{17155E1D-F4AD-41A7-B948-E2D246CCFE8A}"/>
               </a:ext>
             </a:extLst>
           </p:cNvPr>
@@ -8211,7 +7776,7 @@
           <p:cNvPr id="5" name="Title 3">
             <a:extLst>
               <a:ext uri="{FF2B5EF4-FFF2-40B4-BE49-F238E27FC236}">
-                <a16:creationId xmlns="" xmlns:a16="http://schemas.microsoft.com/office/drawing/2014/main" id="{048FBE6B-DC67-4E64-80F4-CADE978D2FE3}"/>
+                <a16:creationId xmlns:a16="http://schemas.microsoft.com/office/drawing/2014/main" id="{048FBE6B-DC67-4E64-80F4-CADE978D2FE3}"/>
               </a:ext>
             </a:extLst>
           </p:cNvPr>
@@ -8254,7 +7819,7 @@
               <a:defRPr/>
             </a:pPr>
             <a:r>
-              <a:rPr kumimoji="0" lang="en-US" sz="4000" b="1" i="0" u="none" strike="noStrike" kern="1200" cap="none" spc="-50" normalizeH="0" baseline="0" noProof="0" dirty="0" smtClean="0">
+              <a:rPr kumimoji="0" lang="en-US" sz="4000" b="1" i="0" u="none" strike="noStrike" kern="1200" cap="none" spc="-50" normalizeH="0" baseline="0" noProof="0" dirty="0">
                 <a:ln w="3175">
                   <a:noFill/>
                 </a:ln>
@@ -8271,7 +7836,7 @@
               <a:t>History</a:t>
             </a:r>
             <a:r>
-              <a:rPr kumimoji="0" lang="en-US" altLang="en-US" sz="4000" b="1" i="0" u="none" strike="noStrike" kern="1200" cap="none" spc="-50" normalizeH="0" baseline="0" noProof="0" dirty="0" smtClean="0">
+              <a:rPr kumimoji="0" lang="en-US" altLang="en-US" sz="4000" b="1" i="0" u="none" strike="noStrike" kern="1200" cap="none" spc="-50" normalizeH="0" baseline="0" noProof="0" dirty="0">
                 <a:ln w="3175">
                   <a:noFill/>
                 </a:ln>
@@ -8285,24 +7850,7 @@
                 <a:ea typeface="+mn-ea"/>
                 <a:cs typeface="Segoe UI" pitchFamily="34" charset="0"/>
               </a:rPr>
-              <a:t>COVID-19 Impact on Navajo </a:t>
-            </a:r>
-            <a:r>
-              <a:rPr kumimoji="0" lang="en-US" altLang="en-US" sz="4000" b="1" i="0" u="none" strike="noStrike" kern="1200" cap="none" spc="-50" normalizeH="0" baseline="0" noProof="0" dirty="0" smtClean="0">
-                <a:ln w="3175">
-                  <a:noFill/>
-                </a:ln>
-                <a:solidFill>
-                  <a:schemeClr val="tx1"/>
-                </a:solidFill>
-                <a:effectLst/>
-                <a:uLnTx/>
-                <a:uFillTx/>
-                <a:latin typeface="+mj-lt"/>
-                <a:ea typeface="+mn-ea"/>
-                <a:cs typeface="Segoe UI" pitchFamily="34" charset="0"/>
-              </a:rPr>
-              <a:t>Nation</a:t>
+              <a:t>COVID-19 Impact on Navajo Nation</a:t>
             </a:r>
             <a:endParaRPr kumimoji="0" lang="en-US" sz="4000" b="1" i="0" u="none" strike="noStrike" kern="1200" cap="none" spc="-50" normalizeH="0" baseline="0" noProof="0" dirty="0">
               <a:ln w="3175">
@@ -8324,20 +7872,20 @@
     </p:spTree>
     <p:extLst>
       <p:ext uri="{BB962C8B-B14F-4D97-AF65-F5344CB8AC3E}">
-        <p14:creationId xmlns="" xmlns:p14="http://schemas.microsoft.com/office/powerpoint/2010/main" val="4244761525"/>
+        <p14:creationId xmlns:p14="http://schemas.microsoft.com/office/powerpoint/2010/main" val="4244761525"/>
       </p:ext>
     </p:extLst>
   </p:cSld>
   <p:clrMapOvr>
     <a:masterClrMapping/>
   </p:clrMapOvr>
-  <mc:AlternateContent xmlns:mc="http://schemas.openxmlformats.org/markup-compatibility/2006">
-    <mc:Choice xmlns="" xmlns:p14="http://schemas.microsoft.com/office/powerpoint/2010/main" Requires="p14">
+  <mc:AlternateContent xmlns:mc="http://schemas.openxmlformats.org/markup-compatibility/2006" xmlns:p14="http://schemas.microsoft.com/office/powerpoint/2010/main">
+    <mc:Choice Requires="p14">
       <p:transition spd="med" p14:dur="700">
         <p:fade/>
       </p:transition>
     </mc:Choice>
-    <mc:Fallback>
+    <mc:Fallback xmlns="">
       <p:transition spd="med">
         <p:fade/>
       </p:transition>
@@ -8379,6 +7927,31 @@
           <a:lstStyle/>
           <a:p>
             <a:pPr marL="457200" indent="-457200"/>
+            <a:r>
+              <a:rPr lang="en-US" sz="2400" dirty="0"/>
+              <a:t>Water is Life </a:t>
+            </a:r>
+          </a:p>
+          <a:p>
+            <a:pPr marL="457200" indent="-457200"/>
+            <a:r>
+              <a:rPr lang="en-US" sz="2400" dirty="0"/>
+              <a:t>On the Navajo Nation about  30% of home do not have running water </a:t>
+            </a:r>
+          </a:p>
+          <a:p>
+            <a:pPr marL="457200" indent="-457200"/>
+            <a:r>
+              <a:rPr lang="en-US" sz="2400" dirty="0"/>
+              <a:t>Most Navajo have to hull in water just to live. </a:t>
+            </a:r>
+          </a:p>
+          <a:p>
+            <a:pPr marL="457200" indent="-457200"/>
+            <a:r>
+              <a:rPr lang="en-US" dirty="0"/>
+              <a:t>The Navajo Nation is sprawling. It’s roughly the size of West Virginia and for some people that means driving as much as two hours to get water. </a:t>
+            </a:r>
             <a:endParaRPr lang="en-US" sz="2400" dirty="0"/>
           </a:p>
         </p:txBody>
@@ -8388,7 +7961,7 @@
           <p:cNvPr id="4" name="Title 3">
             <a:extLst>
               <a:ext uri="{FF2B5EF4-FFF2-40B4-BE49-F238E27FC236}">
-                <a16:creationId xmlns="" xmlns:a16="http://schemas.microsoft.com/office/drawing/2014/main" id="{048FBE6B-DC67-4E64-80F4-CADE978D2FE3}"/>
+                <a16:creationId xmlns:a16="http://schemas.microsoft.com/office/drawing/2014/main" id="{048FBE6B-DC67-4E64-80F4-CADE978D2FE3}"/>
               </a:ext>
             </a:extLst>
           </p:cNvPr>
@@ -8411,16 +7984,8 @@
           <a:p>
             <a:pPr algn="ctr"/>
             <a:r>
-              <a:rPr lang="en-US" altLang="en-US" dirty="0" smtClean="0"/>
-              <a:t>COVID-19 </a:t>
-            </a:r>
-            <a:r>
-              <a:rPr lang="en-US" altLang="en-US" dirty="0" smtClean="0"/>
-              <a:t>Impact on Navajo </a:t>
-            </a:r>
-            <a:r>
-              <a:rPr lang="en-US" altLang="en-US" dirty="0" smtClean="0"/>
-              <a:t>Nation</a:t>
+              <a:rPr lang="en-US" altLang="en-US" dirty="0"/>
+              <a:t>COVID-19 Impact on Navajo Nation</a:t>
             </a:r>
             <a:endParaRPr lang="en-US" dirty="0">
               <a:solidFill>
@@ -8470,7 +8035,46 @@
           <a:bodyPr/>
           <a:lstStyle/>
           <a:p>
-            <a:endParaRPr lang="en-US"/>
+            <a:r>
+              <a:rPr lang="en-US" dirty="0"/>
+              <a:t>Navajo Believe the land to be scared land, most of the culture is around stories that they share among them </a:t>
+            </a:r>
+          </a:p>
+          <a:p>
+            <a:endParaRPr lang="en-US" dirty="0"/>
+          </a:p>
+          <a:p>
+            <a:r>
+              <a:rPr lang="en-US" dirty="0"/>
+              <a:t>They called the Covid an monster, they used the story of creation story tell this story </a:t>
+            </a:r>
+          </a:p>
+          <a:p>
+            <a:endParaRPr lang="en-US" dirty="0"/>
+          </a:p>
+          <a:p>
+            <a:r>
+              <a:rPr lang="en-US" dirty="0"/>
+              <a:t>“The creation story for the Navajo people is one where twin warriors slay monsters that are hurting our people. The virus is another monster that we will overcome,” Young says in the opening of the video.</a:t>
+            </a:r>
+          </a:p>
+          <a:p>
+            <a:endParaRPr lang="en-US" dirty="0"/>
+          </a:p>
+          <a:p>
+            <a:r>
+              <a:rPr lang="en-US" dirty="0"/>
+              <a:t>They have been looking at this virus through Navajo Culture Lens </a:t>
+            </a:r>
+          </a:p>
+          <a:p>
+            <a:endParaRPr lang="en-US" dirty="0"/>
+          </a:p>
+          <a:p>
+            <a:r>
+              <a:rPr lang="en-US" dirty="0"/>
+              <a:t>But the pandemic has given her people a change to show a commitment to culture and resiliency. </a:t>
+            </a:r>
           </a:p>
         </p:txBody>
       </p:sp>
@@ -8479,7 +8083,7 @@
           <p:cNvPr id="4" name="Title 3">
             <a:extLst>
               <a:ext uri="{FF2B5EF4-FFF2-40B4-BE49-F238E27FC236}">
-                <a16:creationId xmlns="" xmlns:a16="http://schemas.microsoft.com/office/drawing/2014/main" id="{048FBE6B-DC67-4E64-80F4-CADE978D2FE3}"/>
+                <a16:creationId xmlns:a16="http://schemas.microsoft.com/office/drawing/2014/main" id="{048FBE6B-DC67-4E64-80F4-CADE978D2FE3}"/>
               </a:ext>
             </a:extLst>
           </p:cNvPr>
@@ -8502,16 +8106,8 @@
           <a:p>
             <a:pPr algn="ctr"/>
             <a:r>
-              <a:rPr lang="en-US" altLang="en-US" dirty="0" smtClean="0"/>
-              <a:t>COVID-19 </a:t>
-            </a:r>
-            <a:r>
-              <a:rPr lang="en-US" altLang="en-US" dirty="0" smtClean="0"/>
-              <a:t>Impact on Navajo </a:t>
-            </a:r>
-            <a:r>
-              <a:rPr lang="en-US" altLang="en-US" dirty="0" smtClean="0"/>
-              <a:t>Nation</a:t>
+              <a:rPr lang="en-US" altLang="en-US" dirty="0"/>
+              <a:t>COVID-19 Impact on Navajo Nation</a:t>
             </a:r>
             <a:endParaRPr lang="en-US" dirty="0">
               <a:solidFill>
@@ -8724,7 +8320,7 @@
   <a:extraClrSchemeLst/>
   <a:extLst>
     <a:ext uri="{05A4C25C-085E-4340-85A3-A5531E510DB2}">
-      <thm15:themeFamily xmlns="" xmlns:thm15="http://schemas.microsoft.com/office/thememl/2012/main" name="Native American Heritage_TM10238373_WAC_LW_v4" id="{CD8DBC1F-6103-47D5-9C71-DE12184EFD6C}" vid="{2507BD49-7026-4E8F-85EA-549F820D09DD}"/>
+      <thm15:themeFamily xmlns:thm15="http://schemas.microsoft.com/office/thememl/2012/main" name="Native American Heritage_TM10238373_WAC_LW_v4" id="{CD8DBC1F-6103-47D5-9C71-DE12184EFD6C}" vid="{2507BD49-7026-4E8F-85EA-549F820D09DD}"/>
     </a:ext>
   </a:extLst>
 </a:theme>
@@ -9023,6 +8619,15 @@
 </file>
 
 <file path=customXml/item2.xml><?xml version="1.0" encoding="utf-8"?>
+<p:properties xmlns:p="http://schemas.microsoft.com/office/2006/metadata/properties" xmlns:xsi="http://www.w3.org/2001/XMLSchema-instance" xmlns:pc="http://schemas.microsoft.com/office/infopath/2007/PartnerControls">
+  <documentManagement>
+    <Status xmlns="71af3243-3dd4-4a8d-8c0d-dd76da1f02a5">Not started</Status>
+    <MediaServiceKeyPoints xmlns="71af3243-3dd4-4a8d-8c0d-dd76da1f02a5" xsi:nil="true"/>
+  </documentManagement>
+</p:properties>
+</file>
+
+<file path=customXml/item3.xml><?xml version="1.0" encoding="utf-8"?>
 <ct:contentTypeSchema xmlns:ct="http://schemas.microsoft.com/office/2006/metadata/contentType" xmlns:ma="http://schemas.microsoft.com/office/2006/metadata/properties/metaAttributes" ct:_="" ma:_="" ma:contentTypeName="Document" ma:contentTypeID="0x01010079F111ED35F8CC479449609E8A0923A6" ma:contentTypeVersion="12" ma:contentTypeDescription="Create a new document." ma:contentTypeScope="" ma:versionID="426e97fa315356fffbdcd9876fe988c2">
   <xsd:schema xmlns:xsd="http://www.w3.org/2001/XMLSchema" xmlns:xs="http://www.w3.org/2001/XMLSchema" xmlns:p="http://schemas.microsoft.com/office/2006/metadata/properties" xmlns:ns2="71af3243-3dd4-4a8d-8c0d-dd76da1f02a5" xmlns:ns3="16c05727-aa75-4e4a-9b5f-8a80a1165891" targetNamespace="http://schemas.microsoft.com/office/2006/metadata/properties" ma:root="true" ma:fieldsID="14b8f0def80e6d70ce3def20c90759ae" ns2:_="" ns3:_="">
     <xsd:import namespace="71af3243-3dd4-4a8d-8c0d-dd76da1f02a5"/>
@@ -9243,15 +8848,6 @@
 </ct:contentTypeSchema>
 </file>
 
-<file path=customXml/item3.xml><?xml version="1.0" encoding="utf-8"?>
-<p:properties xmlns:p="http://schemas.microsoft.com/office/2006/metadata/properties" xmlns:xsi="http://www.w3.org/2001/XMLSchema-instance" xmlns:pc="http://schemas.microsoft.com/office/infopath/2007/PartnerControls">
-  <documentManagement>
-    <Status xmlns="71af3243-3dd4-4a8d-8c0d-dd76da1f02a5">Not started</Status>
-    <MediaServiceKeyPoints xmlns="71af3243-3dd4-4a8d-8c0d-dd76da1f02a5" xsi:nil="true"/>
-  </documentManagement>
-</p:properties>
-</file>
-
 <file path=customXml/itemProps1.xml><?xml version="1.0" encoding="utf-8"?>
 <ds:datastoreItem xmlns:ds="http://schemas.openxmlformats.org/officeDocument/2006/customXml" ds:itemID="{FF48AAC1-C4CE-4FF3-AA8D-E74D22748061}">
   <ds:schemaRefs>
@@ -9261,6 +8857,16 @@
 </file>
 
 <file path=customXml/itemProps2.xml><?xml version="1.0" encoding="utf-8"?>
+<ds:datastoreItem xmlns:ds="http://schemas.openxmlformats.org/officeDocument/2006/customXml" ds:itemID="{F87694BC-F79F-405B-BC53-DDA5DE16E747}">
+  <ds:schemaRefs>
+    <ds:schemaRef ds:uri="http://schemas.microsoft.com/office/2006/metadata/properties"/>
+    <ds:schemaRef ds:uri="http://schemas.microsoft.com/office/infopath/2007/PartnerControls"/>
+    <ds:schemaRef ds:uri="71af3243-3dd4-4a8d-8c0d-dd76da1f02a5"/>
+  </ds:schemaRefs>
+</ds:datastoreItem>
+</file>
+
+<file path=customXml/itemProps3.xml><?xml version="1.0" encoding="utf-8"?>
 <ds:datastoreItem xmlns:ds="http://schemas.openxmlformats.org/officeDocument/2006/customXml" ds:itemID="{6372964D-908E-485C-B8D2-CB277C005C1D}">
   <ds:schemaRefs>
     <ds:schemaRef ds:uri="http://schemas.microsoft.com/office/2006/metadata/contentType"/>
@@ -9277,14 +8883,4 @@
     <ds:schemaRef ds:uri="http://schemas.microsoft.com/internal/obd"/>
   </ds:schemaRefs>
 </ds:datastoreItem>
-</file>
-
-<file path=customXml/itemProps3.xml><?xml version="1.0" encoding="utf-8"?>
-<ds:datastoreItem xmlns:ds="http://schemas.openxmlformats.org/officeDocument/2006/customXml" ds:itemID="{F87694BC-F79F-405B-BC53-DDA5DE16E747}">
-  <ds:schemaRefs>
-    <ds:schemaRef ds:uri="http://schemas.microsoft.com/office/2006/metadata/properties"/>
-    <ds:schemaRef ds:uri="http://schemas.microsoft.com/office/infopath/2007/PartnerControls"/>
-    <ds:schemaRef ds:uri="71af3243-3dd4-4a8d-8c0d-dd76da1f02a5"/>
-  </ds:schemaRefs>
-</ds:datastoreItem>
 </file>
</xml_diff>